<commit_message>
framing out single term search pseudo code
</commit_message>
<xml_diff>
--- a/nlp_map.pptx
+++ b/nlp_map.pptx
@@ -5,14 +5,15 @@
     <p:sldMasterId id="2147483660" r:id="rId1"/>
   </p:sldMasterIdLst>
   <p:sldIdLst>
-    <p:sldId id="263" r:id="rId2"/>
-    <p:sldId id="256" r:id="rId3"/>
-    <p:sldId id="257" r:id="rId4"/>
-    <p:sldId id="258" r:id="rId5"/>
-    <p:sldId id="259" r:id="rId6"/>
+    <p:sldId id="256" r:id="rId2"/>
+    <p:sldId id="257" r:id="rId3"/>
+    <p:sldId id="258" r:id="rId4"/>
+    <p:sldId id="259" r:id="rId5"/>
+    <p:sldId id="265" r:id="rId6"/>
     <p:sldId id="260" r:id="rId7"/>
     <p:sldId id="261" r:id="rId8"/>
     <p:sldId id="262" r:id="rId9"/>
+    <p:sldId id="264" r:id="rId10"/>
   </p:sldIdLst>
   <p:sldSz cx="12192000" cy="13716000"/>
   <p:notesSz cx="6858000" cy="9144000"/>
@@ -111,6 +112,11 @@
       </a:defRPr>
     </a:lvl9pPr>
   </p:defaultTextStyle>
+  <p:extLst>
+    <p:ext uri="{EFAFB233-063F-42B5-8137-9DF3F51BA10A}">
+      <p15:sldGuideLst xmlns:p15="http://schemas.microsoft.com/office/powerpoint/2012/main"/>
+    </p:ext>
+  </p:extLst>
 </p:presentation>
 </file>
 
@@ -245,7 +251,7 @@
           <a:p>
             <a:fld id="{6D19D786-CE7D-4620-A895-09702B27715B}" type="datetimeFigureOut">
               <a:rPr lang="en-US" smtClean="0"/>
-              <a:t>5/16/2022</a:t>
+              <a:t>6/3/2022</a:t>
             </a:fld>
             <a:endParaRPr lang="en-US"/>
           </a:p>
@@ -415,7 +421,7 @@
           <a:p>
             <a:fld id="{6D19D786-CE7D-4620-A895-09702B27715B}" type="datetimeFigureOut">
               <a:rPr lang="en-US" smtClean="0"/>
-              <a:t>5/16/2022</a:t>
+              <a:t>6/3/2022</a:t>
             </a:fld>
             <a:endParaRPr lang="en-US"/>
           </a:p>
@@ -595,7 +601,7 @@
           <a:p>
             <a:fld id="{6D19D786-CE7D-4620-A895-09702B27715B}" type="datetimeFigureOut">
               <a:rPr lang="en-US" smtClean="0"/>
-              <a:t>5/16/2022</a:t>
+              <a:t>6/3/2022</a:t>
             </a:fld>
             <a:endParaRPr lang="en-US"/>
           </a:p>
@@ -765,7 +771,7 @@
           <a:p>
             <a:fld id="{6D19D786-CE7D-4620-A895-09702B27715B}" type="datetimeFigureOut">
               <a:rPr lang="en-US" smtClean="0"/>
-              <a:t>5/16/2022</a:t>
+              <a:t>6/3/2022</a:t>
             </a:fld>
             <a:endParaRPr lang="en-US"/>
           </a:p>
@@ -1009,7 +1015,7 @@
           <a:p>
             <a:fld id="{6D19D786-CE7D-4620-A895-09702B27715B}" type="datetimeFigureOut">
               <a:rPr lang="en-US" smtClean="0"/>
-              <a:t>5/16/2022</a:t>
+              <a:t>6/3/2022</a:t>
             </a:fld>
             <a:endParaRPr lang="en-US"/>
           </a:p>
@@ -1241,7 +1247,7 @@
           <a:p>
             <a:fld id="{6D19D786-CE7D-4620-A895-09702B27715B}" type="datetimeFigureOut">
               <a:rPr lang="en-US" smtClean="0"/>
-              <a:t>5/16/2022</a:t>
+              <a:t>6/3/2022</a:t>
             </a:fld>
             <a:endParaRPr lang="en-US"/>
           </a:p>
@@ -1608,7 +1614,7 @@
           <a:p>
             <a:fld id="{6D19D786-CE7D-4620-A895-09702B27715B}" type="datetimeFigureOut">
               <a:rPr lang="en-US" smtClean="0"/>
-              <a:t>5/16/2022</a:t>
+              <a:t>6/3/2022</a:t>
             </a:fld>
             <a:endParaRPr lang="en-US"/>
           </a:p>
@@ -1726,7 +1732,7 @@
           <a:p>
             <a:fld id="{6D19D786-CE7D-4620-A895-09702B27715B}" type="datetimeFigureOut">
               <a:rPr lang="en-US" smtClean="0"/>
-              <a:t>5/16/2022</a:t>
+              <a:t>6/3/2022</a:t>
             </a:fld>
             <a:endParaRPr lang="en-US"/>
           </a:p>
@@ -1821,7 +1827,7 @@
           <a:p>
             <a:fld id="{6D19D786-CE7D-4620-A895-09702B27715B}" type="datetimeFigureOut">
               <a:rPr lang="en-US" smtClean="0"/>
-              <a:t>5/16/2022</a:t>
+              <a:t>6/3/2022</a:t>
             </a:fld>
             <a:endParaRPr lang="en-US"/>
           </a:p>
@@ -2098,7 +2104,7 @@
           <a:p>
             <a:fld id="{6D19D786-CE7D-4620-A895-09702B27715B}" type="datetimeFigureOut">
               <a:rPr lang="en-US" smtClean="0"/>
-              <a:t>5/16/2022</a:t>
+              <a:t>6/3/2022</a:t>
             </a:fld>
             <a:endParaRPr lang="en-US"/>
           </a:p>
@@ -2355,7 +2361,7 @@
           <a:p>
             <a:fld id="{6D19D786-CE7D-4620-A895-09702B27715B}" type="datetimeFigureOut">
               <a:rPr lang="en-US" smtClean="0"/>
-              <a:t>5/16/2022</a:t>
+              <a:t>6/3/2022</a:t>
             </a:fld>
             <a:endParaRPr lang="en-US"/>
           </a:p>
@@ -2568,7 +2574,7 @@
           <a:p>
             <a:fld id="{6D19D786-CE7D-4620-A895-09702B27715B}" type="datetimeFigureOut">
               <a:rPr lang="en-US" smtClean="0"/>
-              <a:t>5/16/2022</a:t>
+              <a:t>6/3/2022</a:t>
             </a:fld>
             <a:endParaRPr lang="en-US"/>
           </a:p>
@@ -2975,10 +2981,10 @@
       </p:grpSpPr>
       <p:sp>
         <p:nvSpPr>
-          <p:cNvPr id="4" name="Flowchart: Alternate Process 3">
+          <p:cNvPr id="5" name="Flowchart: Magnetic Disk 4">
             <a:extLst>
               <a:ext uri="{FF2B5EF4-FFF2-40B4-BE49-F238E27FC236}">
-                <a16:creationId xmlns:a16="http://schemas.microsoft.com/office/drawing/2014/main" id="{AA2FA298-FFCE-4399-A712-77264B90ED48}"/>
+                <a16:creationId xmlns:a16="http://schemas.microsoft.com/office/drawing/2014/main" id="{0DDD0875-8B7A-4DB1-92E2-196575F70ADC}"/>
               </a:ext>
             </a:extLst>
           </p:cNvPr>
@@ -2987,8 +2993,74 @@
         </p:nvSpPr>
         <p:spPr>
           <a:xfrm>
-            <a:off x="8737602" y="769257"/>
-            <a:ext cx="3164114" cy="420914"/>
+            <a:off x="2840845" y="412507"/>
+            <a:ext cx="1050547" cy="446420"/>
+          </a:xfrm>
+          <a:prstGeom prst="flowChartMagneticDisk">
+            <a:avLst/>
+          </a:prstGeom>
+        </p:spPr>
+        <p:style>
+          <a:lnRef idx="2">
+            <a:schemeClr val="dk1">
+              <a:shade val="50000"/>
+            </a:schemeClr>
+          </a:lnRef>
+          <a:fillRef idx="1">
+            <a:schemeClr val="dk1"/>
+          </a:fillRef>
+          <a:effectRef idx="0">
+            <a:schemeClr val="dk1"/>
+          </a:effectRef>
+          <a:fontRef idx="minor">
+            <a:schemeClr val="lt1"/>
+          </a:fontRef>
+        </p:style>
+        <p:txBody>
+          <a:bodyPr rtlCol="0" anchor="ctr"/>
+          <a:lstStyle/>
+          <a:p>
+            <a:pPr algn="ctr"/>
+            <a:r>
+              <a:rPr lang="en-US" dirty="0">
+                <a:solidFill>
+                  <a:schemeClr val="bg1"/>
+                </a:solidFill>
+              </a:rPr>
+              <a:t>raw </a:t>
+            </a:r>
+            <a:r>
+              <a:rPr lang="en-US" dirty="0" err="1">
+                <a:solidFill>
+                  <a:schemeClr val="bg1"/>
+                </a:solidFill>
+              </a:rPr>
+              <a:t>csvs</a:t>
+            </a:r>
+            <a:endParaRPr lang="en-US" dirty="0">
+              <a:solidFill>
+                <a:schemeClr val="bg1"/>
+              </a:solidFill>
+            </a:endParaRPr>
+          </a:p>
+        </p:txBody>
+      </p:sp>
+      <p:sp>
+        <p:nvSpPr>
+          <p:cNvPr id="6" name="Flowchart: Alternate Process 5">
+            <a:extLst>
+              <a:ext uri="{FF2B5EF4-FFF2-40B4-BE49-F238E27FC236}">
+                <a16:creationId xmlns:a16="http://schemas.microsoft.com/office/drawing/2014/main" id="{439BDC6C-99C0-4491-A3B7-00F31C00E0D2}"/>
+              </a:ext>
+            </a:extLst>
+          </p:cNvPr>
+          <p:cNvSpPr/>
+          <p:nvPr/>
+        </p:nvSpPr>
+        <p:spPr>
+          <a:xfrm>
+            <a:off x="4246167" y="412507"/>
+            <a:ext cx="2575547" cy="487004"/>
           </a:xfrm>
           <a:prstGeom prst="flowChartAlternateProcess">
             <a:avLst/>
@@ -3017,17 +3089,17 @@
             <a:pPr algn="ctr"/>
             <a:r>
               <a:rPr lang="en-US" dirty="0"/>
-              <a:t>TensorFlow</a:t>
-            </a:r>
-          </a:p>
-        </p:txBody>
-      </p:sp>
-      <p:sp>
-        <p:nvSpPr>
-          <p:cNvPr id="5" name="Flowchart: Alternate Process 4">
+              <a:t>load_and_concat_csvs</a:t>
+            </a:r>
+          </a:p>
+        </p:txBody>
+      </p:sp>
+      <p:sp>
+        <p:nvSpPr>
+          <p:cNvPr id="7" name="Flowchart: Internal Storage 6">
             <a:extLst>
               <a:ext uri="{FF2B5EF4-FFF2-40B4-BE49-F238E27FC236}">
-                <a16:creationId xmlns:a16="http://schemas.microsoft.com/office/drawing/2014/main" id="{AEFBBBB3-BC41-4908-8C8C-4038639B3E43}"/>
+                <a16:creationId xmlns:a16="http://schemas.microsoft.com/office/drawing/2014/main" id="{3FEDCA49-ABDC-494A-9087-805039530AD4}"/>
               </a:ext>
             </a:extLst>
           </p:cNvPr>
@@ -3036,8 +3108,57 @@
         </p:nvSpPr>
         <p:spPr>
           <a:xfrm>
-            <a:off x="8737601" y="1444172"/>
-            <a:ext cx="3164114" cy="420914"/>
+            <a:off x="7176489" y="480858"/>
+            <a:ext cx="1023834" cy="350301"/>
+          </a:xfrm>
+          <a:prstGeom prst="flowChartInternalStorage">
+            <a:avLst/>
+          </a:prstGeom>
+        </p:spPr>
+        <p:style>
+          <a:lnRef idx="2">
+            <a:schemeClr val="accent3">
+              <a:shade val="50000"/>
+            </a:schemeClr>
+          </a:lnRef>
+          <a:fillRef idx="1">
+            <a:schemeClr val="accent3"/>
+          </a:fillRef>
+          <a:effectRef idx="0">
+            <a:schemeClr val="accent3"/>
+          </a:effectRef>
+          <a:fontRef idx="minor">
+            <a:schemeClr val="lt1"/>
+          </a:fontRef>
+        </p:style>
+        <p:txBody>
+          <a:bodyPr rtlCol="0" anchor="ctr"/>
+          <a:lstStyle/>
+          <a:p>
+            <a:pPr algn="ctr"/>
+            <a:r>
+              <a:rPr lang="en-US" dirty="0"/>
+              <a:t>df_raw</a:t>
+            </a:r>
+          </a:p>
+        </p:txBody>
+      </p:sp>
+      <p:sp>
+        <p:nvSpPr>
+          <p:cNvPr id="9" name="Flowchart: Alternate Process 8">
+            <a:extLst>
+              <a:ext uri="{FF2B5EF4-FFF2-40B4-BE49-F238E27FC236}">
+                <a16:creationId xmlns:a16="http://schemas.microsoft.com/office/drawing/2014/main" id="{9B43A897-BA40-48CB-B049-5570A7FA3C3B}"/>
+              </a:ext>
+            </a:extLst>
+          </p:cNvPr>
+          <p:cNvSpPr/>
+          <p:nvPr/>
+        </p:nvSpPr>
+        <p:spPr>
+          <a:xfrm>
+            <a:off x="4246166" y="1622159"/>
+            <a:ext cx="2575547" cy="487004"/>
           </a:xfrm>
           <a:prstGeom prst="flowChartAlternateProcess">
             <a:avLst/>
@@ -3065,18 +3186,19 @@
           <a:p>
             <a:pPr algn="ctr"/>
             <a:r>
-              <a:rPr lang="en-US" dirty="0"/>
-              <a:t>pandas</a:t>
-            </a:r>
-          </a:p>
-        </p:txBody>
-      </p:sp>
-      <p:sp>
-        <p:nvSpPr>
-          <p:cNvPr id="6" name="Flowchart: Alternate Process 5">
+              <a:rPr lang="en-US" dirty="0" err="1"/>
+              <a:t>clean_raw_csv</a:t>
+            </a:r>
+            <a:endParaRPr lang="en-US" dirty="0"/>
+          </a:p>
+        </p:txBody>
+      </p:sp>
+      <p:sp>
+        <p:nvSpPr>
+          <p:cNvPr id="10" name="Flowchart: Internal Storage 9">
             <a:extLst>
               <a:ext uri="{FF2B5EF4-FFF2-40B4-BE49-F238E27FC236}">
-                <a16:creationId xmlns:a16="http://schemas.microsoft.com/office/drawing/2014/main" id="{FD557261-63A2-40B3-86CE-91BDB9A39A9F}"/>
+                <a16:creationId xmlns:a16="http://schemas.microsoft.com/office/drawing/2014/main" id="{36D9E19B-A107-4BEC-952C-74786C01D05B}"/>
               </a:ext>
             </a:extLst>
           </p:cNvPr>
@@ -3085,8 +3207,206 @@
         </p:nvSpPr>
         <p:spPr>
           <a:xfrm>
-            <a:off x="8737601" y="2119087"/>
-            <a:ext cx="3164114" cy="420914"/>
+            <a:off x="2840845" y="1690510"/>
+            <a:ext cx="1023834" cy="350301"/>
+          </a:xfrm>
+          <a:prstGeom prst="flowChartInternalStorage">
+            <a:avLst/>
+          </a:prstGeom>
+        </p:spPr>
+        <p:style>
+          <a:lnRef idx="2">
+            <a:schemeClr val="accent3">
+              <a:shade val="50000"/>
+            </a:schemeClr>
+          </a:lnRef>
+          <a:fillRef idx="1">
+            <a:schemeClr val="accent3"/>
+          </a:fillRef>
+          <a:effectRef idx="0">
+            <a:schemeClr val="accent3"/>
+          </a:effectRef>
+          <a:fontRef idx="minor">
+            <a:schemeClr val="lt1"/>
+          </a:fontRef>
+        </p:style>
+        <p:txBody>
+          <a:bodyPr rtlCol="0" anchor="ctr"/>
+          <a:lstStyle/>
+          <a:p>
+            <a:pPr algn="ctr"/>
+            <a:r>
+              <a:rPr lang="en-US" dirty="0"/>
+              <a:t>df_raw</a:t>
+            </a:r>
+          </a:p>
+        </p:txBody>
+      </p:sp>
+      <p:sp>
+        <p:nvSpPr>
+          <p:cNvPr id="11" name="Flowchart: Internal Storage 10">
+            <a:extLst>
+              <a:ext uri="{FF2B5EF4-FFF2-40B4-BE49-F238E27FC236}">
+                <a16:creationId xmlns:a16="http://schemas.microsoft.com/office/drawing/2014/main" id="{ECD2DED3-C184-4323-BBCE-389DE2E1F46E}"/>
+              </a:ext>
+            </a:extLst>
+          </p:cNvPr>
+          <p:cNvSpPr/>
+          <p:nvPr/>
+        </p:nvSpPr>
+        <p:spPr>
+          <a:xfrm>
+            <a:off x="7176489" y="1737665"/>
+            <a:ext cx="1023834" cy="350301"/>
+          </a:xfrm>
+          <a:prstGeom prst="flowChartInternalStorage">
+            <a:avLst/>
+          </a:prstGeom>
+        </p:spPr>
+        <p:style>
+          <a:lnRef idx="2">
+            <a:schemeClr val="accent3">
+              <a:shade val="50000"/>
+            </a:schemeClr>
+          </a:lnRef>
+          <a:fillRef idx="1">
+            <a:schemeClr val="accent3"/>
+          </a:fillRef>
+          <a:effectRef idx="0">
+            <a:schemeClr val="accent3"/>
+          </a:effectRef>
+          <a:fontRef idx="minor">
+            <a:schemeClr val="lt1"/>
+          </a:fontRef>
+        </p:style>
+        <p:txBody>
+          <a:bodyPr rtlCol="0" anchor="ctr"/>
+          <a:lstStyle/>
+          <a:p>
+            <a:pPr algn="ctr"/>
+            <a:r>
+              <a:rPr lang="en-US" dirty="0"/>
+              <a:t>df</a:t>
+            </a:r>
+          </a:p>
+        </p:txBody>
+      </p:sp>
+      <p:sp>
+        <p:nvSpPr>
+          <p:cNvPr id="12" name="TextBox 11">
+            <a:extLst>
+              <a:ext uri="{FF2B5EF4-FFF2-40B4-BE49-F238E27FC236}">
+                <a16:creationId xmlns:a16="http://schemas.microsoft.com/office/drawing/2014/main" id="{E28DA012-B3F1-40F8-B9B6-7B7C2EE22A72}"/>
+              </a:ext>
+            </a:extLst>
+          </p:cNvPr>
+          <p:cNvSpPr txBox="1"/>
+          <p:nvPr/>
+        </p:nvSpPr>
+        <p:spPr>
+          <a:xfrm>
+            <a:off x="7176489" y="2818822"/>
+            <a:ext cx="2485490" cy="419338"/>
+          </a:xfrm>
+          <a:prstGeom prst="flowChartInternalStorage">
+            <a:avLst/>
+          </a:prstGeom>
+        </p:spPr>
+        <p:style>
+          <a:lnRef idx="2">
+            <a:schemeClr val="accent3">
+              <a:shade val="50000"/>
+            </a:schemeClr>
+          </a:lnRef>
+          <a:fillRef idx="1">
+            <a:schemeClr val="accent3"/>
+          </a:fillRef>
+          <a:effectRef idx="0">
+            <a:schemeClr val="accent3"/>
+          </a:effectRef>
+          <a:fontRef idx="minor">
+            <a:schemeClr val="lt1"/>
+          </a:fontRef>
+        </p:style>
+        <p:txBody>
+          <a:bodyPr wrap="square" rtlCol="0">
+            <a:spAutoFit/>
+          </a:bodyPr>
+          <a:lstStyle/>
+          <a:p>
+            <a:r>
+              <a:rPr lang="en-US" dirty="0" err="1"/>
+              <a:t>series_of_interest</a:t>
+            </a:r>
+            <a:endParaRPr lang="en-US" dirty="0"/>
+          </a:p>
+        </p:txBody>
+      </p:sp>
+      <p:sp>
+        <p:nvSpPr>
+          <p:cNvPr id="13" name="Flowchart: Internal Storage 12">
+            <a:extLst>
+              <a:ext uri="{FF2B5EF4-FFF2-40B4-BE49-F238E27FC236}">
+                <a16:creationId xmlns:a16="http://schemas.microsoft.com/office/drawing/2014/main" id="{B2FD2C2E-2149-40BF-97B0-9B1F0CF22683}"/>
+              </a:ext>
+            </a:extLst>
+          </p:cNvPr>
+          <p:cNvSpPr/>
+          <p:nvPr/>
+        </p:nvSpPr>
+        <p:spPr>
+          <a:xfrm>
+            <a:off x="4246166" y="2831811"/>
+            <a:ext cx="2575547" cy="350301"/>
+          </a:xfrm>
+          <a:prstGeom prst="flowChartInternalStorage">
+            <a:avLst/>
+          </a:prstGeom>
+        </p:spPr>
+        <p:style>
+          <a:lnRef idx="2">
+            <a:schemeClr val="accent3">
+              <a:shade val="50000"/>
+            </a:schemeClr>
+          </a:lnRef>
+          <a:fillRef idx="1">
+            <a:schemeClr val="accent3"/>
+          </a:fillRef>
+          <a:effectRef idx="0">
+            <a:schemeClr val="accent3"/>
+          </a:effectRef>
+          <a:fontRef idx="minor">
+            <a:schemeClr val="lt1"/>
+          </a:fontRef>
+        </p:style>
+        <p:txBody>
+          <a:bodyPr rtlCol="0" anchor="ctr"/>
+          <a:lstStyle/>
+          <a:p>
+            <a:pPr algn="ctr"/>
+            <a:r>
+              <a:rPr lang="en-US" dirty="0"/>
+              <a:t>df[‘job description’]</a:t>
+            </a:r>
+          </a:p>
+        </p:txBody>
+      </p:sp>
+      <p:sp>
+        <p:nvSpPr>
+          <p:cNvPr id="14" name="Flowchart: Alternate Process 13">
+            <a:extLst>
+              <a:ext uri="{FF2B5EF4-FFF2-40B4-BE49-F238E27FC236}">
+                <a16:creationId xmlns:a16="http://schemas.microsoft.com/office/drawing/2014/main" id="{362071C0-5F6E-470B-A2E9-4AA7D21BB5B3}"/>
+              </a:ext>
+            </a:extLst>
+          </p:cNvPr>
+          <p:cNvSpPr/>
+          <p:nvPr/>
+        </p:nvSpPr>
+        <p:spPr>
+          <a:xfrm>
+            <a:off x="4246165" y="4009759"/>
+            <a:ext cx="2575547" cy="487004"/>
           </a:xfrm>
           <a:prstGeom prst="flowChartAlternateProcess">
             <a:avLst/>
@@ -3115,7 +3435,7 @@
             <a:pPr algn="ctr"/>
             <a:r>
               <a:rPr lang="en-US" dirty="0" err="1"/>
-              <a:t>numpy</a:t>
+              <a:t>clean_terms_for_nlp</a:t>
             </a:r>
             <a:endParaRPr lang="en-US" dirty="0"/>
           </a:p>
@@ -3123,10 +3443,61 @@
       </p:sp>
       <p:sp>
         <p:nvSpPr>
-          <p:cNvPr id="7" name="Flowchart: Alternate Process 6">
+          <p:cNvPr id="16" name="TextBox 15">
             <a:extLst>
               <a:ext uri="{FF2B5EF4-FFF2-40B4-BE49-F238E27FC236}">
-                <a16:creationId xmlns:a16="http://schemas.microsoft.com/office/drawing/2014/main" id="{9B3E11F2-23A8-4317-A9C7-05B5BE98ECD2}"/>
+                <a16:creationId xmlns:a16="http://schemas.microsoft.com/office/drawing/2014/main" id="{A8D2C342-58F0-48CC-9542-A3E941A1CC2E}"/>
+              </a:ext>
+            </a:extLst>
+          </p:cNvPr>
+          <p:cNvSpPr txBox="1"/>
+          <p:nvPr/>
+        </p:nvSpPr>
+        <p:spPr>
+          <a:xfrm>
+            <a:off x="1379189" y="4040732"/>
+            <a:ext cx="2485490" cy="419338"/>
+          </a:xfrm>
+          <a:prstGeom prst="flowChartInternalStorage">
+            <a:avLst/>
+          </a:prstGeom>
+        </p:spPr>
+        <p:style>
+          <a:lnRef idx="2">
+            <a:schemeClr val="accent3">
+              <a:shade val="50000"/>
+            </a:schemeClr>
+          </a:lnRef>
+          <a:fillRef idx="1">
+            <a:schemeClr val="accent3"/>
+          </a:fillRef>
+          <a:effectRef idx="0">
+            <a:schemeClr val="accent3"/>
+          </a:effectRef>
+          <a:fontRef idx="minor">
+            <a:schemeClr val="lt1"/>
+          </a:fontRef>
+        </p:style>
+        <p:txBody>
+          <a:bodyPr wrap="square" rtlCol="0">
+            <a:spAutoFit/>
+          </a:bodyPr>
+          <a:lstStyle/>
+          <a:p>
+            <a:r>
+              <a:rPr lang="en-US" dirty="0" err="1"/>
+              <a:t>series_of_interest</a:t>
+            </a:r>
+            <a:endParaRPr lang="en-US" dirty="0"/>
+          </a:p>
+        </p:txBody>
+      </p:sp>
+      <p:sp>
+        <p:nvSpPr>
+          <p:cNvPr id="17" name="Flowchart: Predefined Process 16">
+            <a:extLst>
+              <a:ext uri="{FF2B5EF4-FFF2-40B4-BE49-F238E27FC236}">
+                <a16:creationId xmlns:a16="http://schemas.microsoft.com/office/drawing/2014/main" id="{3BF1D7BC-0937-49CC-86EC-F91E3462A80A}"/>
               </a:ext>
             </a:extLst>
           </p:cNvPr>
@@ -3135,8 +3506,161 @@
         </p:nvSpPr>
         <p:spPr>
           <a:xfrm>
-            <a:off x="8737601" y="2873833"/>
-            <a:ext cx="3164114" cy="420914"/>
+            <a:off x="7203198" y="4040732"/>
+            <a:ext cx="2494225" cy="350301"/>
+          </a:xfrm>
+          <a:prstGeom prst="flowChartPredefinedProcess">
+            <a:avLst/>
+          </a:prstGeom>
+        </p:spPr>
+        <p:style>
+          <a:lnRef idx="2">
+            <a:schemeClr val="accent6">
+              <a:shade val="50000"/>
+            </a:schemeClr>
+          </a:lnRef>
+          <a:fillRef idx="1">
+            <a:schemeClr val="accent6"/>
+          </a:fillRef>
+          <a:effectRef idx="0">
+            <a:schemeClr val="accent6"/>
+          </a:effectRef>
+          <a:fontRef idx="minor">
+            <a:schemeClr val="lt1"/>
+          </a:fontRef>
+        </p:style>
+        <p:txBody>
+          <a:bodyPr rtlCol="0" anchor="ctr"/>
+          <a:lstStyle/>
+          <a:p>
+            <a:pPr algn="ctr"/>
+            <a:r>
+              <a:rPr lang="en-US" dirty="0" err="1"/>
+              <a:t>terms_for_nlp</a:t>
+            </a:r>
+            <a:endParaRPr lang="en-US" dirty="0"/>
+          </a:p>
+        </p:txBody>
+      </p:sp>
+      <p:sp>
+        <p:nvSpPr>
+          <p:cNvPr id="18" name="Flowchart: Predefined Process 17">
+            <a:extLst>
+              <a:ext uri="{FF2B5EF4-FFF2-40B4-BE49-F238E27FC236}">
+                <a16:creationId xmlns:a16="http://schemas.microsoft.com/office/drawing/2014/main" id="{B97BAB4A-89D9-41F8-AAAC-575C39376910}"/>
+              </a:ext>
+            </a:extLst>
+          </p:cNvPr>
+          <p:cNvSpPr/>
+          <p:nvPr/>
+        </p:nvSpPr>
+        <p:spPr>
+          <a:xfrm>
+            <a:off x="7203198" y="3659458"/>
+            <a:ext cx="2485489" cy="350301"/>
+          </a:xfrm>
+          <a:prstGeom prst="flowChartPredefinedProcess">
+            <a:avLst/>
+          </a:prstGeom>
+          <a:solidFill>
+            <a:srgbClr val="7030A0"/>
+          </a:solidFill>
+        </p:spPr>
+        <p:style>
+          <a:lnRef idx="2">
+            <a:schemeClr val="accent6">
+              <a:shade val="50000"/>
+            </a:schemeClr>
+          </a:lnRef>
+          <a:fillRef idx="1">
+            <a:schemeClr val="accent6"/>
+          </a:fillRef>
+          <a:effectRef idx="0">
+            <a:schemeClr val="accent6"/>
+          </a:effectRef>
+          <a:fontRef idx="minor">
+            <a:schemeClr val="lt1"/>
+          </a:fontRef>
+        </p:style>
+        <p:txBody>
+          <a:bodyPr rtlCol="0" anchor="ctr"/>
+          <a:lstStyle/>
+          <a:p>
+            <a:pPr algn="ctr"/>
+            <a:r>
+              <a:rPr lang="en-US" dirty="0" err="1"/>
+              <a:t>term_fixes</a:t>
+            </a:r>
+            <a:endParaRPr lang="en-US" dirty="0"/>
+          </a:p>
+        </p:txBody>
+      </p:sp>
+      <p:sp>
+        <p:nvSpPr>
+          <p:cNvPr id="19" name="Flowchart: Predefined Process 18">
+            <a:extLst>
+              <a:ext uri="{FF2B5EF4-FFF2-40B4-BE49-F238E27FC236}">
+                <a16:creationId xmlns:a16="http://schemas.microsoft.com/office/drawing/2014/main" id="{B668F92D-FCEF-4D83-B0AC-75521890BCEB}"/>
+              </a:ext>
+            </a:extLst>
+          </p:cNvPr>
+          <p:cNvSpPr/>
+          <p:nvPr/>
+        </p:nvSpPr>
+        <p:spPr>
+          <a:xfrm>
+            <a:off x="7194462" y="4465069"/>
+            <a:ext cx="3067138" cy="350301"/>
+          </a:xfrm>
+          <a:prstGeom prst="flowChartPredefinedProcess">
+            <a:avLst/>
+          </a:prstGeom>
+        </p:spPr>
+        <p:style>
+          <a:lnRef idx="2">
+            <a:schemeClr val="accent6">
+              <a:shade val="50000"/>
+            </a:schemeClr>
+          </a:lnRef>
+          <a:fillRef idx="1">
+            <a:schemeClr val="accent6"/>
+          </a:fillRef>
+          <a:effectRef idx="0">
+            <a:schemeClr val="accent6"/>
+          </a:effectRef>
+          <a:fontRef idx="minor">
+            <a:schemeClr val="lt1"/>
+          </a:fontRef>
+        </p:style>
+        <p:txBody>
+          <a:bodyPr rtlCol="0" anchor="ctr"/>
+          <a:lstStyle/>
+          <a:p>
+            <a:pPr algn="ctr"/>
+            <a:r>
+              <a:rPr lang="en-US" dirty="0" err="1"/>
+              <a:t>additional_stopwords</a:t>
+            </a:r>
+            <a:endParaRPr lang="en-US" dirty="0"/>
+          </a:p>
+        </p:txBody>
+      </p:sp>
+      <p:sp>
+        <p:nvSpPr>
+          <p:cNvPr id="20" name="Flowchart: Alternate Process 19">
+            <a:extLst>
+              <a:ext uri="{FF2B5EF4-FFF2-40B4-BE49-F238E27FC236}">
+                <a16:creationId xmlns:a16="http://schemas.microsoft.com/office/drawing/2014/main" id="{8C765E03-2BA7-48AA-BE18-2E4ED0AA51E3}"/>
+              </a:ext>
+            </a:extLst>
+          </p:cNvPr>
+          <p:cNvSpPr/>
+          <p:nvPr/>
+        </p:nvSpPr>
+        <p:spPr>
+          <a:xfrm>
+            <a:off x="4246164" y="5628102"/>
+            <a:ext cx="2575547" cy="487004"/>
           </a:xfrm>
           <a:prstGeom prst="flowChartAlternateProcess">
             <a:avLst/>
@@ -3165,7 +3689,7 @@
             <a:pPr algn="ctr"/>
             <a:r>
               <a:rPr lang="en-US" dirty="0" err="1"/>
-              <a:t>keras</a:t>
+              <a:t>nlp_skill_lists</a:t>
             </a:r>
             <a:endParaRPr lang="en-US" dirty="0"/>
           </a:p>
@@ -3173,10 +3697,10 @@
       </p:sp>
       <p:sp>
         <p:nvSpPr>
-          <p:cNvPr id="8" name="Flowchart: Alternate Process 7">
+          <p:cNvPr id="21" name="Flowchart: Predefined Process 20">
             <a:extLst>
               <a:ext uri="{FF2B5EF4-FFF2-40B4-BE49-F238E27FC236}">
-                <a16:creationId xmlns:a16="http://schemas.microsoft.com/office/drawing/2014/main" id="{197E1976-C903-4D69-868B-FFD6C26564AF}"/>
+                <a16:creationId xmlns:a16="http://schemas.microsoft.com/office/drawing/2014/main" id="{CCA7D4D5-6596-4698-82AA-DC7D58389EE6}"/>
               </a:ext>
             </a:extLst>
           </p:cNvPr>
@@ -3185,8 +3709,142 @@
         </p:nvSpPr>
         <p:spPr>
           <a:xfrm>
-            <a:off x="8737601" y="3628579"/>
-            <a:ext cx="3164114" cy="420914"/>
+            <a:off x="824254" y="5696453"/>
+            <a:ext cx="3067138" cy="350301"/>
+          </a:xfrm>
+          <a:prstGeom prst="flowChartPredefinedProcess">
+            <a:avLst/>
+          </a:prstGeom>
+        </p:spPr>
+        <p:style>
+          <a:lnRef idx="2">
+            <a:schemeClr val="accent6">
+              <a:shade val="50000"/>
+            </a:schemeClr>
+          </a:lnRef>
+          <a:fillRef idx="1">
+            <a:schemeClr val="accent6"/>
+          </a:fillRef>
+          <a:effectRef idx="0">
+            <a:schemeClr val="accent6"/>
+          </a:effectRef>
+          <a:fontRef idx="minor">
+            <a:schemeClr val="lt1"/>
+          </a:fontRef>
+        </p:style>
+        <p:txBody>
+          <a:bodyPr rtlCol="0" anchor="ctr"/>
+          <a:lstStyle/>
+          <a:p>
+            <a:pPr algn="ctr"/>
+            <a:r>
+              <a:rPr lang="en-US" dirty="0" err="1"/>
+              <a:t>additional_stopwords</a:t>
+            </a:r>
+            <a:endParaRPr lang="en-US" dirty="0"/>
+          </a:p>
+        </p:txBody>
+      </p:sp>
+      <p:sp>
+        <p:nvSpPr>
+          <p:cNvPr id="22" name="Flowchart: Predefined Process 21">
+            <a:extLst>
+              <a:ext uri="{FF2B5EF4-FFF2-40B4-BE49-F238E27FC236}">
+                <a16:creationId xmlns:a16="http://schemas.microsoft.com/office/drawing/2014/main" id="{5CB64379-9540-4BF0-A788-C280CE1A2C0F}"/>
+              </a:ext>
+            </a:extLst>
+          </p:cNvPr>
+          <p:cNvSpPr/>
+          <p:nvPr/>
+        </p:nvSpPr>
+        <p:spPr>
+          <a:xfrm>
+            <a:off x="7176483" y="5579358"/>
+            <a:ext cx="3067138" cy="350301"/>
+          </a:xfrm>
+          <a:prstGeom prst="flowChartPredefinedProcess">
+            <a:avLst/>
+          </a:prstGeom>
+        </p:spPr>
+        <p:style>
+          <a:lnRef idx="2">
+            <a:schemeClr val="accent6">
+              <a:shade val="50000"/>
+            </a:schemeClr>
+          </a:lnRef>
+          <a:fillRef idx="1">
+            <a:schemeClr val="accent6"/>
+          </a:fillRef>
+          <a:effectRef idx="0">
+            <a:schemeClr val="accent6"/>
+          </a:effectRef>
+          <a:fontRef idx="minor">
+            <a:schemeClr val="lt1"/>
+          </a:fontRef>
+        </p:style>
+        <p:txBody>
+          <a:bodyPr rtlCol="0" anchor="ctr"/>
+          <a:lstStyle/>
+          <a:p>
+            <a:pPr algn="ctr"/>
+            <a:r>
+              <a:rPr lang="en-US" dirty="0"/>
+              <a:t>skill and subtopic lists</a:t>
+            </a:r>
+          </a:p>
+        </p:txBody>
+      </p:sp>
+      <p:sp>
+        <p:nvSpPr>
+          <p:cNvPr id="23" name="TextBox 22">
+            <a:extLst>
+              <a:ext uri="{FF2B5EF4-FFF2-40B4-BE49-F238E27FC236}">
+                <a16:creationId xmlns:a16="http://schemas.microsoft.com/office/drawing/2014/main" id="{F33F8169-18B0-4527-BA19-CB0AA397B1BB}"/>
+              </a:ext>
+            </a:extLst>
+          </p:cNvPr>
+          <p:cNvSpPr txBox="1"/>
+          <p:nvPr/>
+        </p:nvSpPr>
+        <p:spPr>
+          <a:xfrm>
+            <a:off x="8532779" y="5857613"/>
+            <a:ext cx="343364" cy="369332"/>
+          </a:xfrm>
+          <a:prstGeom prst="rect">
+            <a:avLst/>
+          </a:prstGeom>
+          <a:noFill/>
+        </p:spPr>
+        <p:txBody>
+          <a:bodyPr wrap="none" rtlCol="0">
+            <a:spAutoFit/>
+          </a:bodyPr>
+          <a:lstStyle/>
+          <a:p>
+            <a:r>
+              <a:rPr lang="en-US" dirty="0"/>
+              <a:t>…</a:t>
+            </a:r>
+          </a:p>
+        </p:txBody>
+      </p:sp>
+      <p:sp>
+        <p:nvSpPr>
+          <p:cNvPr id="24" name="Flowchart: Alternate Process 23">
+            <a:extLst>
+              <a:ext uri="{FF2B5EF4-FFF2-40B4-BE49-F238E27FC236}">
+                <a16:creationId xmlns:a16="http://schemas.microsoft.com/office/drawing/2014/main" id="{AEA92B93-F4F5-45E7-95A2-D54FA6FBF7CC}"/>
+              </a:ext>
+            </a:extLst>
+          </p:cNvPr>
+          <p:cNvSpPr/>
+          <p:nvPr/>
+        </p:nvSpPr>
+        <p:spPr>
+          <a:xfrm>
+            <a:off x="4246164" y="6906061"/>
+            <a:ext cx="2575547" cy="487004"/>
           </a:xfrm>
           <a:prstGeom prst="flowChartAlternateProcess">
             <a:avLst/>
@@ -3215,7 +3873,7 @@
             <a:pPr algn="ctr"/>
             <a:r>
               <a:rPr lang="en-US" dirty="0" err="1"/>
-              <a:t>pytorch</a:t>
+              <a:t>nlp_count_n_grams</a:t>
             </a:r>
             <a:endParaRPr lang="en-US" dirty="0"/>
           </a:p>
@@ -3223,22 +3881,22 @@
       </p:sp>
       <p:sp>
         <p:nvSpPr>
-          <p:cNvPr id="9" name="Flowchart: Alternate Process 8">
+          <p:cNvPr id="25" name="TextBox 24">
             <a:extLst>
               <a:ext uri="{FF2B5EF4-FFF2-40B4-BE49-F238E27FC236}">
-                <a16:creationId xmlns:a16="http://schemas.microsoft.com/office/drawing/2014/main" id="{240115F9-AC2B-4C47-94EA-BE3F3D7B3CBE}"/>
+                <a16:creationId xmlns:a16="http://schemas.microsoft.com/office/drawing/2014/main" id="{1FD4FB1B-7AB6-4625-B9E0-22A20A524D7C}"/>
               </a:ext>
             </a:extLst>
           </p:cNvPr>
-          <p:cNvSpPr/>
+          <p:cNvSpPr txBox="1"/>
           <p:nvPr/>
         </p:nvSpPr>
         <p:spPr>
           <a:xfrm>
-            <a:off x="290284" y="293928"/>
-            <a:ext cx="885370" cy="5511785"/>
-          </a:xfrm>
-          <a:prstGeom prst="flowChartAlternateProcess">
+            <a:off x="7290034" y="6976231"/>
+            <a:ext cx="2485490" cy="419338"/>
+          </a:xfrm>
+          <a:prstGeom prst="flowChartInternalStorage">
             <a:avLst/>
           </a:prstGeom>
         </p:spPr>
@@ -3259,13 +3917,14 @@
           </a:fontRef>
         </p:style>
         <p:txBody>
-          <a:bodyPr rtlCol="0" anchor="ctr"/>
-          <a:lstStyle/>
-          <a:p>
-            <a:pPr algn="ctr"/>
+          <a:bodyPr wrap="square" rtlCol="0">
+            <a:spAutoFit/>
+          </a:bodyPr>
+          <a:lstStyle/>
+          <a:p>
             <a:r>
               <a:rPr lang="en-US" dirty="0" err="1"/>
-              <a:t>aws</a:t>
+              <a:t>n_grams</a:t>
             </a:r>
             <a:endParaRPr lang="en-US" dirty="0"/>
           </a:p>
@@ -3273,10 +3932,10 @@
       </p:sp>
       <p:sp>
         <p:nvSpPr>
-          <p:cNvPr id="10" name="Flowchart: Alternate Process 9">
+          <p:cNvPr id="26" name="Flowchart: Predefined Process 25">
             <a:extLst>
               <a:ext uri="{FF2B5EF4-FFF2-40B4-BE49-F238E27FC236}">
-                <a16:creationId xmlns:a16="http://schemas.microsoft.com/office/drawing/2014/main" id="{049993B4-500A-4F9E-A9EA-29D918A67D0F}"/>
+                <a16:creationId xmlns:a16="http://schemas.microsoft.com/office/drawing/2014/main" id="{990EC00D-A93F-4DAE-882C-A8CF7525A3EC}"/>
               </a:ext>
             </a:extLst>
           </p:cNvPr>
@@ -3285,10 +3944,110 @@
         </p:nvSpPr>
         <p:spPr>
           <a:xfrm>
-            <a:off x="8737600" y="8447328"/>
-            <a:ext cx="3164115" cy="420914"/>
+            <a:off x="1110710" y="6976231"/>
+            <a:ext cx="2494225" cy="350301"/>
+          </a:xfrm>
+          <a:prstGeom prst="flowChartPredefinedProcess">
+            <a:avLst/>
+          </a:prstGeom>
+        </p:spPr>
+        <p:style>
+          <a:lnRef idx="2">
+            <a:schemeClr val="accent6">
+              <a:shade val="50000"/>
+            </a:schemeClr>
+          </a:lnRef>
+          <a:fillRef idx="1">
+            <a:schemeClr val="accent6"/>
+          </a:fillRef>
+          <a:effectRef idx="0">
+            <a:schemeClr val="accent6"/>
+          </a:effectRef>
+          <a:fontRef idx="minor">
+            <a:schemeClr val="lt1"/>
+          </a:fontRef>
+        </p:style>
+        <p:txBody>
+          <a:bodyPr rtlCol="0" anchor="ctr"/>
+          <a:lstStyle/>
+          <a:p>
+            <a:pPr algn="ctr"/>
+            <a:r>
+              <a:rPr lang="en-US" dirty="0" err="1"/>
+              <a:t>terms_for_nlp</a:t>
+            </a:r>
+            <a:endParaRPr lang="en-US" dirty="0"/>
+          </a:p>
+        </p:txBody>
+      </p:sp>
+      <p:sp>
+        <p:nvSpPr>
+          <p:cNvPr id="28" name="Flowchart: Alternate Process 27">
+            <a:extLst>
+              <a:ext uri="{FF2B5EF4-FFF2-40B4-BE49-F238E27FC236}">
+                <a16:creationId xmlns:a16="http://schemas.microsoft.com/office/drawing/2014/main" id="{0002F5BC-0492-4562-8161-55253986DB98}"/>
+              </a:ext>
+            </a:extLst>
+          </p:cNvPr>
+          <p:cNvSpPr/>
+          <p:nvPr/>
+        </p:nvSpPr>
+        <p:spPr>
+          <a:xfrm>
+            <a:off x="4246164" y="7910703"/>
+            <a:ext cx="2575547" cy="487004"/>
           </a:xfrm>
           <a:prstGeom prst="flowChartAlternateProcess">
+            <a:avLst/>
+          </a:prstGeom>
+        </p:spPr>
+        <p:style>
+          <a:lnRef idx="2">
+            <a:schemeClr val="accent1">
+              <a:shade val="50000"/>
+            </a:schemeClr>
+          </a:lnRef>
+          <a:fillRef idx="1">
+            <a:schemeClr val="accent1"/>
+          </a:fillRef>
+          <a:effectRef idx="0">
+            <a:schemeClr val="accent1"/>
+          </a:effectRef>
+          <a:fontRef idx="minor">
+            <a:schemeClr val="lt1"/>
+          </a:fontRef>
+        </p:style>
+        <p:txBody>
+          <a:bodyPr rtlCol="0" anchor="ctr"/>
+          <a:lstStyle/>
+          <a:p>
+            <a:pPr algn="ctr"/>
+            <a:r>
+              <a:rPr lang="en-US" dirty="0" err="1"/>
+              <a:t>viz_indeed_metdata</a:t>
+            </a:r>
+            <a:endParaRPr lang="en-US" dirty="0"/>
+          </a:p>
+        </p:txBody>
+      </p:sp>
+      <p:sp>
+        <p:nvSpPr>
+          <p:cNvPr id="29" name="Flowchart: Internal Storage 28">
+            <a:extLst>
+              <a:ext uri="{FF2B5EF4-FFF2-40B4-BE49-F238E27FC236}">
+                <a16:creationId xmlns:a16="http://schemas.microsoft.com/office/drawing/2014/main" id="{EC0E4911-D368-46B9-932E-ED13975A1A9A}"/>
+              </a:ext>
+            </a:extLst>
+          </p:cNvPr>
+          <p:cNvSpPr/>
+          <p:nvPr/>
+        </p:nvSpPr>
+        <p:spPr>
+          <a:xfrm>
+            <a:off x="2682453" y="7979054"/>
+            <a:ext cx="1023834" cy="350301"/>
+          </a:xfrm>
+          <a:prstGeom prst="flowChartInternalStorage">
             <a:avLst/>
           </a:prstGeom>
         </p:spPr>
@@ -3314,19 +4073,18 @@
           <a:p>
             <a:pPr algn="ctr"/>
             <a:r>
-              <a:rPr lang="en-US" dirty="0" err="1"/>
-              <a:t>gcp</a:t>
-            </a:r>
-            <a:endParaRPr lang="en-US" dirty="0"/>
-          </a:p>
-        </p:txBody>
-      </p:sp>
-      <p:sp>
-        <p:nvSpPr>
-          <p:cNvPr id="11" name="Flowchart: Alternate Process 10">
+              <a:rPr lang="en-US" dirty="0"/>
+              <a:t>df</a:t>
+            </a:r>
+          </a:p>
+        </p:txBody>
+      </p:sp>
+      <p:sp>
+        <p:nvSpPr>
+          <p:cNvPr id="30" name="Flowchart: Alternate Process 29">
             <a:extLst>
               <a:ext uri="{FF2B5EF4-FFF2-40B4-BE49-F238E27FC236}">
-                <a16:creationId xmlns:a16="http://schemas.microsoft.com/office/drawing/2014/main" id="{A1C4F516-8A03-454B-BFD0-72F800D9754D}"/>
+                <a16:creationId xmlns:a16="http://schemas.microsoft.com/office/drawing/2014/main" id="{8A7CE71C-B2D1-49D5-8312-F84D7B96D409}"/>
               </a:ext>
             </a:extLst>
           </p:cNvPr>
@@ -3335,10 +4093,60 @@
         </p:nvSpPr>
         <p:spPr>
           <a:xfrm>
-            <a:off x="8737599" y="9202074"/>
-            <a:ext cx="3164115" cy="420914"/>
+            <a:off x="4246164" y="8915345"/>
+            <a:ext cx="2575547" cy="487004"/>
           </a:xfrm>
           <a:prstGeom prst="flowChartAlternateProcess">
+            <a:avLst/>
+          </a:prstGeom>
+        </p:spPr>
+        <p:style>
+          <a:lnRef idx="2">
+            <a:schemeClr val="accent1">
+              <a:shade val="50000"/>
+            </a:schemeClr>
+          </a:lnRef>
+          <a:fillRef idx="1">
+            <a:schemeClr val="accent1"/>
+          </a:fillRef>
+          <a:effectRef idx="0">
+            <a:schemeClr val="accent1"/>
+          </a:effectRef>
+          <a:fontRef idx="minor">
+            <a:schemeClr val="lt1"/>
+          </a:fontRef>
+        </p:style>
+        <p:txBody>
+          <a:bodyPr rtlCol="0" anchor="ctr"/>
+          <a:lstStyle/>
+          <a:p>
+            <a:pPr algn="ctr"/>
+            <a:r>
+              <a:rPr lang="en-US" dirty="0" err="1"/>
+              <a:t>viz_word_clouds</a:t>
+            </a:r>
+            <a:endParaRPr lang="en-US" dirty="0"/>
+          </a:p>
+        </p:txBody>
+      </p:sp>
+      <p:sp>
+        <p:nvSpPr>
+          <p:cNvPr id="31" name="TextBox 30">
+            <a:extLst>
+              <a:ext uri="{FF2B5EF4-FFF2-40B4-BE49-F238E27FC236}">
+                <a16:creationId xmlns:a16="http://schemas.microsoft.com/office/drawing/2014/main" id="{7FE73C38-E4EF-443A-8729-AFB80AE5F1F7}"/>
+              </a:ext>
+            </a:extLst>
+          </p:cNvPr>
+          <p:cNvSpPr txBox="1"/>
+          <p:nvPr/>
+        </p:nvSpPr>
+        <p:spPr>
+          <a:xfrm>
+            <a:off x="1379189" y="8689683"/>
+            <a:ext cx="2485490" cy="419338"/>
+          </a:xfrm>
+          <a:prstGeom prst="flowChartInternalStorage">
             <a:avLst/>
           </a:prstGeom>
         </p:spPr>
@@ -3359,23 +4167,25 @@
           </a:fontRef>
         </p:style>
         <p:txBody>
-          <a:bodyPr rtlCol="0" anchor="ctr"/>
-          <a:lstStyle/>
-          <a:p>
-            <a:pPr algn="ctr"/>
-            <a:r>
-              <a:rPr lang="en-US" dirty="0"/>
-              <a:t>azure</a:t>
-            </a:r>
-          </a:p>
-        </p:txBody>
-      </p:sp>
-      <p:sp>
-        <p:nvSpPr>
-          <p:cNvPr id="12" name="Flowchart: Alternate Process 11">
+          <a:bodyPr wrap="square" rtlCol="0">
+            <a:spAutoFit/>
+          </a:bodyPr>
+          <a:lstStyle/>
+          <a:p>
+            <a:r>
+              <a:rPr lang="en-US" dirty="0" err="1"/>
+              <a:t>series_of_interest</a:t>
+            </a:r>
+            <a:endParaRPr lang="en-US" dirty="0"/>
+          </a:p>
+        </p:txBody>
+      </p:sp>
+      <p:sp>
+        <p:nvSpPr>
+          <p:cNvPr id="32" name="Flowchart: Predefined Process 31">
             <a:extLst>
               <a:ext uri="{FF2B5EF4-FFF2-40B4-BE49-F238E27FC236}">
-                <a16:creationId xmlns:a16="http://schemas.microsoft.com/office/drawing/2014/main" id="{BC5F1D7D-2A23-490A-8618-5DF45F5D8E19}"/>
+                <a16:creationId xmlns:a16="http://schemas.microsoft.com/office/drawing/2014/main" id="{333D3F9F-CE2F-471C-9091-97873C4BDAAB}"/>
               </a:ext>
             </a:extLst>
           </p:cNvPr>
@@ -3384,24 +4194,24 @@
         </p:nvSpPr>
         <p:spPr>
           <a:xfrm>
-            <a:off x="8737598" y="10517436"/>
-            <a:ext cx="3164115" cy="420914"/>
-          </a:xfrm>
-          <a:prstGeom prst="flowChartAlternateProcess">
+            <a:off x="1370454" y="9164883"/>
+            <a:ext cx="2494225" cy="350301"/>
+          </a:xfrm>
+          <a:prstGeom prst="flowChartPredefinedProcess">
             <a:avLst/>
           </a:prstGeom>
         </p:spPr>
         <p:style>
           <a:lnRef idx="2">
-            <a:schemeClr val="accent2">
+            <a:schemeClr val="accent6">
               <a:shade val="50000"/>
             </a:schemeClr>
           </a:lnRef>
           <a:fillRef idx="1">
-            <a:schemeClr val="accent2"/>
+            <a:schemeClr val="accent6"/>
           </a:fillRef>
           <a:effectRef idx="0">
-            <a:schemeClr val="accent2"/>
+            <a:schemeClr val="accent6"/>
           </a:effectRef>
           <a:fontRef idx="minor">
             <a:schemeClr val="lt1"/>
@@ -3413,18 +4223,19 @@
           <a:p>
             <a:pPr algn="ctr"/>
             <a:r>
-              <a:rPr lang="en-US" dirty="0"/>
-              <a:t>tableau</a:t>
-            </a:r>
-          </a:p>
-        </p:txBody>
-      </p:sp>
-      <p:sp>
-        <p:nvSpPr>
-          <p:cNvPr id="13" name="Flowchart: Alternate Process 12">
+              <a:rPr lang="en-US" dirty="0" err="1"/>
+              <a:t>terms_for_nlp</a:t>
+            </a:r>
+            <a:endParaRPr lang="en-US" dirty="0"/>
+          </a:p>
+        </p:txBody>
+      </p:sp>
+      <p:sp>
+        <p:nvSpPr>
+          <p:cNvPr id="33" name="Flowchart: Alternate Process 32">
             <a:extLst>
               <a:ext uri="{FF2B5EF4-FFF2-40B4-BE49-F238E27FC236}">
-                <a16:creationId xmlns:a16="http://schemas.microsoft.com/office/drawing/2014/main" id="{ACE0C660-413C-4146-965A-C84BDB4FDD16}"/>
+                <a16:creationId xmlns:a16="http://schemas.microsoft.com/office/drawing/2014/main" id="{BAE9F1F3-CA7A-44CD-8B59-84A1CC843A65}"/>
               </a:ext>
             </a:extLst>
           </p:cNvPr>
@@ -3433,8 +4244,8 @@
         </p:nvSpPr>
         <p:spPr>
           <a:xfrm>
-            <a:off x="8737600" y="4365178"/>
-            <a:ext cx="3164114" cy="420914"/>
+            <a:off x="4246163" y="9919987"/>
+            <a:ext cx="2575547" cy="487004"/>
           </a:xfrm>
           <a:prstGeom prst="flowChartAlternateProcess">
             <a:avLst/>
@@ -3462,69 +4273,189 @@
           <a:p>
             <a:pPr algn="ctr"/>
             <a:r>
-              <a:rPr lang="en-US" dirty="0"/>
-              <a:t>ml algorithms</a:t>
-            </a:r>
-          </a:p>
-        </p:txBody>
-      </p:sp>
-      <p:sp>
-        <p:nvSpPr>
-          <p:cNvPr id="14" name="Flowchart: Alternate Process 13">
+              <a:rPr lang="en-US" dirty="0" err="1"/>
+              <a:t>viz_n_grams</a:t>
+            </a:r>
+            <a:endParaRPr lang="en-US" dirty="0"/>
+          </a:p>
+        </p:txBody>
+      </p:sp>
+      <p:sp>
+        <p:nvSpPr>
+          <p:cNvPr id="34" name="TextBox 33">
             <a:extLst>
               <a:ext uri="{FF2B5EF4-FFF2-40B4-BE49-F238E27FC236}">
-                <a16:creationId xmlns:a16="http://schemas.microsoft.com/office/drawing/2014/main" id="{0203667A-9AE2-4BA1-BCEC-F7F75509D488}"/>
+                <a16:creationId xmlns:a16="http://schemas.microsoft.com/office/drawing/2014/main" id="{9F0F2FFC-63A4-42BF-85FD-B20F82797DBB}"/>
               </a:ext>
             </a:extLst>
           </p:cNvPr>
-          <p:cNvSpPr/>
+          <p:cNvSpPr txBox="1"/>
           <p:nvPr/>
         </p:nvSpPr>
         <p:spPr>
           <a:xfrm>
-            <a:off x="1291772" y="348342"/>
-            <a:ext cx="2423886" cy="1095829"/>
-          </a:xfrm>
-          <a:prstGeom prst="flowChartAlternateProcess">
+            <a:off x="7363434" y="7979054"/>
+            <a:ext cx="2165016" cy="369332"/>
+          </a:xfrm>
+          <a:prstGeom prst="rect">
             <a:avLst/>
           </a:prstGeom>
+          <a:noFill/>
+        </p:spPr>
+        <p:txBody>
+          <a:bodyPr wrap="none" rtlCol="0">
+            <a:spAutoFit/>
+          </a:bodyPr>
+          <a:lstStyle/>
+          <a:p>
+            <a:r>
+              <a:rPr lang="en-US" dirty="0"/>
+              <a:t>&lt;direct visualization&gt;</a:t>
+            </a:r>
+          </a:p>
+        </p:txBody>
+      </p:sp>
+      <p:sp>
+        <p:nvSpPr>
+          <p:cNvPr id="35" name="TextBox 34">
+            <a:extLst>
+              <a:ext uri="{FF2B5EF4-FFF2-40B4-BE49-F238E27FC236}">
+                <a16:creationId xmlns:a16="http://schemas.microsoft.com/office/drawing/2014/main" id="{F855CFFB-E3B1-45A5-96DB-A5D42AA8D945}"/>
+              </a:ext>
+            </a:extLst>
+          </p:cNvPr>
+          <p:cNvSpPr txBox="1"/>
+          <p:nvPr/>
+        </p:nvSpPr>
+        <p:spPr>
+          <a:xfrm>
+            <a:off x="7336726" y="8931871"/>
+            <a:ext cx="2165016" cy="369332"/>
+          </a:xfrm>
+          <a:prstGeom prst="rect">
+            <a:avLst/>
+          </a:prstGeom>
+          <a:noFill/>
+        </p:spPr>
+        <p:txBody>
+          <a:bodyPr wrap="none" rtlCol="0">
+            <a:spAutoFit/>
+          </a:bodyPr>
+          <a:lstStyle/>
+          <a:p>
+            <a:r>
+              <a:rPr lang="en-US" dirty="0"/>
+              <a:t>&lt;direct visualization&gt;</a:t>
+            </a:r>
+          </a:p>
+        </p:txBody>
+      </p:sp>
+      <p:sp>
+        <p:nvSpPr>
+          <p:cNvPr id="36" name="TextBox 35">
+            <a:extLst>
+              <a:ext uri="{FF2B5EF4-FFF2-40B4-BE49-F238E27FC236}">
+                <a16:creationId xmlns:a16="http://schemas.microsoft.com/office/drawing/2014/main" id="{6631A04F-4424-45AF-9CCD-4874663DBA43}"/>
+              </a:ext>
+            </a:extLst>
+          </p:cNvPr>
+          <p:cNvSpPr txBox="1"/>
+          <p:nvPr/>
+        </p:nvSpPr>
+        <p:spPr>
+          <a:xfrm>
+            <a:off x="7326954" y="9987653"/>
+            <a:ext cx="2450046" cy="419338"/>
+          </a:xfrm>
+          <a:prstGeom prst="flowChartInternalStorage">
+            <a:avLst/>
+          </a:prstGeom>
         </p:spPr>
         <p:style>
           <a:lnRef idx="2">
-            <a:schemeClr val="accent1">
+            <a:schemeClr val="accent3">
               <a:shade val="50000"/>
             </a:schemeClr>
           </a:lnRef>
           <a:fillRef idx="1">
-            <a:schemeClr val="accent1"/>
+            <a:schemeClr val="accent3"/>
           </a:fillRef>
           <a:effectRef idx="0">
-            <a:schemeClr val="accent1"/>
+            <a:schemeClr val="accent3"/>
           </a:effectRef>
           <a:fontRef idx="minor">
             <a:schemeClr val="lt1"/>
           </a:fontRef>
         </p:style>
         <p:txBody>
-          <a:bodyPr rtlCol="0" anchor="ctr"/>
-          <a:lstStyle/>
-          <a:p>
-            <a:pPr algn="ctr"/>
+          <a:bodyPr wrap="square" rtlCol="0">
+            <a:spAutoFit/>
+          </a:bodyPr>
+          <a:lstStyle/>
+          <a:p>
             <a:r>
               <a:rPr lang="en-US" dirty="0" err="1"/>
-              <a:t>nltk</a:t>
-            </a:r>
-            <a:r>
-              <a:rPr lang="en-US" dirty="0"/>
-              <a:t>, genism, spacy, polyglot, regex</a:t>
-            </a:r>
+              <a:t>df_jobs_raw</a:t>
+            </a:r>
+            <a:endParaRPr lang="en-US" dirty="0"/>
+          </a:p>
+        </p:txBody>
+      </p:sp>
+      <p:sp>
+        <p:nvSpPr>
+          <p:cNvPr id="37" name="TextBox 36">
+            <a:extLst>
+              <a:ext uri="{FF2B5EF4-FFF2-40B4-BE49-F238E27FC236}">
+                <a16:creationId xmlns:a16="http://schemas.microsoft.com/office/drawing/2014/main" id="{E043D3B6-BA67-4860-BAFF-18E5B5B44A43}"/>
+              </a:ext>
+            </a:extLst>
+          </p:cNvPr>
+          <p:cNvSpPr txBox="1"/>
+          <p:nvPr/>
+        </p:nvSpPr>
+        <p:spPr>
+          <a:xfrm>
+            <a:off x="1405902" y="10163489"/>
+            <a:ext cx="2485490" cy="419338"/>
+          </a:xfrm>
+          <a:prstGeom prst="flowChartInternalStorage">
+            <a:avLst/>
+          </a:prstGeom>
+        </p:spPr>
+        <p:style>
+          <a:lnRef idx="2">
+            <a:schemeClr val="accent3">
+              <a:shade val="50000"/>
+            </a:schemeClr>
+          </a:lnRef>
+          <a:fillRef idx="1">
+            <a:schemeClr val="accent3"/>
+          </a:fillRef>
+          <a:effectRef idx="0">
+            <a:schemeClr val="accent3"/>
+          </a:effectRef>
+          <a:fontRef idx="minor">
+            <a:schemeClr val="lt1"/>
+          </a:fontRef>
+        </p:style>
+        <p:txBody>
+          <a:bodyPr wrap="square" rtlCol="0">
+            <a:spAutoFit/>
+          </a:bodyPr>
+          <a:lstStyle/>
+          <a:p>
+            <a:r>
+              <a:rPr lang="en-US" dirty="0" err="1"/>
+              <a:t>n_grams</a:t>
+            </a:r>
+            <a:endParaRPr lang="en-US" dirty="0"/>
           </a:p>
         </p:txBody>
       </p:sp>
     </p:spTree>
     <p:extLst>
       <p:ext uri="{BB962C8B-B14F-4D97-AF65-F5344CB8AC3E}">
-        <p14:creationId xmlns:p14="http://schemas.microsoft.com/office/powerpoint/2010/main" val="1128965048"/>
+        <p14:creationId xmlns:p14="http://schemas.microsoft.com/office/powerpoint/2010/main" val="398556617"/>
       </p:ext>
     </p:extLst>
   </p:cSld>
@@ -3553,10 +4484,10 @@
       </p:grpSpPr>
       <p:sp>
         <p:nvSpPr>
-          <p:cNvPr id="5" name="Flowchart: Magnetic Disk 4">
+          <p:cNvPr id="37" name="Flowchart: Internal Storage 36">
             <a:extLst>
               <a:ext uri="{FF2B5EF4-FFF2-40B4-BE49-F238E27FC236}">
-                <a16:creationId xmlns:a16="http://schemas.microsoft.com/office/drawing/2014/main" id="{0DDD0875-8B7A-4DB1-92E2-196575F70ADC}"/>
+                <a16:creationId xmlns:a16="http://schemas.microsoft.com/office/drawing/2014/main" id="{B899CFF5-5C3B-454F-9483-021D8C20CBC7}"/>
               </a:ext>
             </a:extLst>
           </p:cNvPr>
@@ -3565,123 +4496,8 @@
         </p:nvSpPr>
         <p:spPr>
           <a:xfrm>
-            <a:off x="2840845" y="412507"/>
-            <a:ext cx="1050547" cy="446420"/>
-          </a:xfrm>
-          <a:prstGeom prst="flowChartMagneticDisk">
-            <a:avLst/>
-          </a:prstGeom>
-        </p:spPr>
-        <p:style>
-          <a:lnRef idx="2">
-            <a:schemeClr val="dk1">
-              <a:shade val="50000"/>
-            </a:schemeClr>
-          </a:lnRef>
-          <a:fillRef idx="1">
-            <a:schemeClr val="dk1"/>
-          </a:fillRef>
-          <a:effectRef idx="0">
-            <a:schemeClr val="dk1"/>
-          </a:effectRef>
-          <a:fontRef idx="minor">
-            <a:schemeClr val="lt1"/>
-          </a:fontRef>
-        </p:style>
-        <p:txBody>
-          <a:bodyPr rtlCol="0" anchor="ctr"/>
-          <a:lstStyle/>
-          <a:p>
-            <a:pPr algn="ctr"/>
-            <a:r>
-              <a:rPr lang="en-US" dirty="0">
-                <a:solidFill>
-                  <a:schemeClr val="bg1"/>
-                </a:solidFill>
-              </a:rPr>
-              <a:t>raw </a:t>
-            </a:r>
-            <a:r>
-              <a:rPr lang="en-US" dirty="0" err="1">
-                <a:solidFill>
-                  <a:schemeClr val="bg1"/>
-                </a:solidFill>
-              </a:rPr>
-              <a:t>csvs</a:t>
-            </a:r>
-            <a:endParaRPr lang="en-US" dirty="0">
-              <a:solidFill>
-                <a:schemeClr val="bg1"/>
-              </a:solidFill>
-            </a:endParaRPr>
-          </a:p>
-        </p:txBody>
-      </p:sp>
-      <p:sp>
-        <p:nvSpPr>
-          <p:cNvPr id="6" name="Flowchart: Alternate Process 5">
-            <a:extLst>
-              <a:ext uri="{FF2B5EF4-FFF2-40B4-BE49-F238E27FC236}">
-                <a16:creationId xmlns:a16="http://schemas.microsoft.com/office/drawing/2014/main" id="{439BDC6C-99C0-4491-A3B7-00F31C00E0D2}"/>
-              </a:ext>
-            </a:extLst>
-          </p:cNvPr>
-          <p:cNvSpPr/>
-          <p:nvPr/>
-        </p:nvSpPr>
-        <p:spPr>
-          <a:xfrm>
-            <a:off x="4246167" y="412507"/>
-            <a:ext cx="2575547" cy="487004"/>
-          </a:xfrm>
-          <a:prstGeom prst="flowChartAlternateProcess">
-            <a:avLst/>
-          </a:prstGeom>
-        </p:spPr>
-        <p:style>
-          <a:lnRef idx="2">
-            <a:schemeClr val="accent1">
-              <a:shade val="50000"/>
-            </a:schemeClr>
-          </a:lnRef>
-          <a:fillRef idx="1">
-            <a:schemeClr val="accent1"/>
-          </a:fillRef>
-          <a:effectRef idx="0">
-            <a:schemeClr val="accent1"/>
-          </a:effectRef>
-          <a:fontRef idx="minor">
-            <a:schemeClr val="lt1"/>
-          </a:fontRef>
-        </p:style>
-        <p:txBody>
-          <a:bodyPr rtlCol="0" anchor="ctr"/>
-          <a:lstStyle/>
-          <a:p>
-            <a:pPr algn="ctr"/>
-            <a:r>
-              <a:rPr lang="en-US" dirty="0"/>
-              <a:t>load_and_concat_csvs</a:t>
-            </a:r>
-          </a:p>
-        </p:txBody>
-      </p:sp>
-      <p:sp>
-        <p:nvSpPr>
-          <p:cNvPr id="7" name="Flowchart: Internal Storage 6">
-            <a:extLst>
-              <a:ext uri="{FF2B5EF4-FFF2-40B4-BE49-F238E27FC236}">
-                <a16:creationId xmlns:a16="http://schemas.microsoft.com/office/drawing/2014/main" id="{3FEDCA49-ABDC-494A-9087-805039530AD4}"/>
-              </a:ext>
-            </a:extLst>
-          </p:cNvPr>
-          <p:cNvSpPr/>
-          <p:nvPr/>
-        </p:nvSpPr>
-        <p:spPr>
-          <a:xfrm>
-            <a:off x="7176489" y="480858"/>
-            <a:ext cx="1023834" cy="350301"/>
+            <a:off x="3340935" y="228179"/>
+            <a:ext cx="5510130" cy="1789307"/>
           </a:xfrm>
           <a:prstGeom prst="flowChartInternalStorage">
             <a:avLst/>
@@ -3709,166 +4525,48 @@
           <a:p>
             <a:pPr algn="ctr"/>
             <a:r>
-              <a:rPr lang="en-US" dirty="0"/>
+              <a:rPr lang="en-US" sz="11500" dirty="0"/>
               <a:t>df_raw</a:t>
             </a:r>
           </a:p>
         </p:txBody>
       </p:sp>
-      <p:sp>
-        <p:nvSpPr>
-          <p:cNvPr id="9" name="Flowchart: Alternate Process 8">
+      <p:pic>
+        <p:nvPicPr>
+          <p:cNvPr id="38" name="Picture 37">
             <a:extLst>
               <a:ext uri="{FF2B5EF4-FFF2-40B4-BE49-F238E27FC236}">
-                <a16:creationId xmlns:a16="http://schemas.microsoft.com/office/drawing/2014/main" id="{9B43A897-BA40-48CB-B049-5570A7FA3C3B}"/>
+                <a16:creationId xmlns:a16="http://schemas.microsoft.com/office/drawing/2014/main" id="{5DC27DDC-8171-4CF5-96BF-A6733484AF66}"/>
               </a:ext>
             </a:extLst>
           </p:cNvPr>
-          <p:cNvSpPr/>
+          <p:cNvPicPr>
+            <a:picLocks noChangeAspect="1"/>
+          </p:cNvPicPr>
           <p:nvPr/>
-        </p:nvSpPr>
-        <p:spPr>
-          <a:xfrm>
-            <a:off x="4246166" y="1622159"/>
-            <a:ext cx="2575547" cy="487004"/>
-          </a:xfrm>
-          <a:prstGeom prst="flowChartAlternateProcess">
+        </p:nvPicPr>
+        <p:blipFill>
+          <a:blip r:embed="rId2"/>
+          <a:stretch>
+            <a:fillRect/>
+          </a:stretch>
+        </p:blipFill>
+        <p:spPr>
+          <a:xfrm>
+            <a:off x="442912" y="2399619"/>
+            <a:ext cx="11306175" cy="3952875"/>
+          </a:xfrm>
+          <a:prstGeom prst="rect">
             <a:avLst/>
           </a:prstGeom>
         </p:spPr>
-        <p:style>
-          <a:lnRef idx="2">
-            <a:schemeClr val="accent1">
-              <a:shade val="50000"/>
-            </a:schemeClr>
-          </a:lnRef>
-          <a:fillRef idx="1">
-            <a:schemeClr val="accent1"/>
-          </a:fillRef>
-          <a:effectRef idx="0">
-            <a:schemeClr val="accent1"/>
-          </a:effectRef>
-          <a:fontRef idx="minor">
-            <a:schemeClr val="lt1"/>
-          </a:fontRef>
-        </p:style>
-        <p:txBody>
-          <a:bodyPr rtlCol="0" anchor="ctr"/>
-          <a:lstStyle/>
-          <a:p>
-            <a:pPr algn="ctr"/>
-            <a:r>
-              <a:rPr lang="en-US" dirty="0" err="1"/>
-              <a:t>clean_raw_csv</a:t>
-            </a:r>
-            <a:endParaRPr lang="en-US" dirty="0"/>
-          </a:p>
-        </p:txBody>
-      </p:sp>
-      <p:sp>
-        <p:nvSpPr>
-          <p:cNvPr id="10" name="Flowchart: Internal Storage 9">
+      </p:pic>
+      <p:sp>
+        <p:nvSpPr>
+          <p:cNvPr id="2" name="TextBox 1">
             <a:extLst>
               <a:ext uri="{FF2B5EF4-FFF2-40B4-BE49-F238E27FC236}">
-                <a16:creationId xmlns:a16="http://schemas.microsoft.com/office/drawing/2014/main" id="{36D9E19B-A107-4BEC-952C-74786C01D05B}"/>
-              </a:ext>
-            </a:extLst>
-          </p:cNvPr>
-          <p:cNvSpPr/>
-          <p:nvPr/>
-        </p:nvSpPr>
-        <p:spPr>
-          <a:xfrm>
-            <a:off x="2840845" y="1690510"/>
-            <a:ext cx="1023834" cy="350301"/>
-          </a:xfrm>
-          <a:prstGeom prst="flowChartInternalStorage">
-            <a:avLst/>
-          </a:prstGeom>
-        </p:spPr>
-        <p:style>
-          <a:lnRef idx="2">
-            <a:schemeClr val="accent3">
-              <a:shade val="50000"/>
-            </a:schemeClr>
-          </a:lnRef>
-          <a:fillRef idx="1">
-            <a:schemeClr val="accent3"/>
-          </a:fillRef>
-          <a:effectRef idx="0">
-            <a:schemeClr val="accent3"/>
-          </a:effectRef>
-          <a:fontRef idx="minor">
-            <a:schemeClr val="lt1"/>
-          </a:fontRef>
-        </p:style>
-        <p:txBody>
-          <a:bodyPr rtlCol="0" anchor="ctr"/>
-          <a:lstStyle/>
-          <a:p>
-            <a:pPr algn="ctr"/>
-            <a:r>
-              <a:rPr lang="en-US" dirty="0"/>
-              <a:t>df_raw</a:t>
-            </a:r>
-          </a:p>
-        </p:txBody>
-      </p:sp>
-      <p:sp>
-        <p:nvSpPr>
-          <p:cNvPr id="11" name="Flowchart: Internal Storage 10">
-            <a:extLst>
-              <a:ext uri="{FF2B5EF4-FFF2-40B4-BE49-F238E27FC236}">
-                <a16:creationId xmlns:a16="http://schemas.microsoft.com/office/drawing/2014/main" id="{ECD2DED3-C184-4323-BBCE-389DE2E1F46E}"/>
-              </a:ext>
-            </a:extLst>
-          </p:cNvPr>
-          <p:cNvSpPr/>
-          <p:nvPr/>
-        </p:nvSpPr>
-        <p:spPr>
-          <a:xfrm>
-            <a:off x="7176489" y="1737665"/>
-            <a:ext cx="1023834" cy="350301"/>
-          </a:xfrm>
-          <a:prstGeom prst="flowChartInternalStorage">
-            <a:avLst/>
-          </a:prstGeom>
-        </p:spPr>
-        <p:style>
-          <a:lnRef idx="2">
-            <a:schemeClr val="accent3">
-              <a:shade val="50000"/>
-            </a:schemeClr>
-          </a:lnRef>
-          <a:fillRef idx="1">
-            <a:schemeClr val="accent3"/>
-          </a:fillRef>
-          <a:effectRef idx="0">
-            <a:schemeClr val="accent3"/>
-          </a:effectRef>
-          <a:fontRef idx="minor">
-            <a:schemeClr val="lt1"/>
-          </a:fontRef>
-        </p:style>
-        <p:txBody>
-          <a:bodyPr rtlCol="0" anchor="ctr"/>
-          <a:lstStyle/>
-          <a:p>
-            <a:pPr algn="ctr"/>
-            <a:r>
-              <a:rPr lang="en-US" dirty="0"/>
-              <a:t>df</a:t>
-            </a:r>
-          </a:p>
-        </p:txBody>
-      </p:sp>
-      <p:sp>
-        <p:nvSpPr>
-          <p:cNvPr id="12" name="TextBox 11">
-            <a:extLst>
-              <a:ext uri="{FF2B5EF4-FFF2-40B4-BE49-F238E27FC236}">
-                <a16:creationId xmlns:a16="http://schemas.microsoft.com/office/drawing/2014/main" id="{E28DA012-B3F1-40F8-B9B6-7B7C2EE22A72}"/>
+                <a16:creationId xmlns:a16="http://schemas.microsoft.com/office/drawing/2014/main" id="{84926692-43D8-4FF9-B995-0392C1125FB8}"/>
               </a:ext>
             </a:extLst>
           </p:cNvPr>
@@ -3877,511 +4575,8 @@
         </p:nvSpPr>
         <p:spPr>
           <a:xfrm>
-            <a:off x="7176489" y="2818822"/>
-            <a:ext cx="2485490" cy="419338"/>
-          </a:xfrm>
-          <a:prstGeom prst="flowChartInternalStorage">
-            <a:avLst/>
-          </a:prstGeom>
-        </p:spPr>
-        <p:style>
-          <a:lnRef idx="2">
-            <a:schemeClr val="accent3">
-              <a:shade val="50000"/>
-            </a:schemeClr>
-          </a:lnRef>
-          <a:fillRef idx="1">
-            <a:schemeClr val="accent3"/>
-          </a:fillRef>
-          <a:effectRef idx="0">
-            <a:schemeClr val="accent3"/>
-          </a:effectRef>
-          <a:fontRef idx="minor">
-            <a:schemeClr val="lt1"/>
-          </a:fontRef>
-        </p:style>
-        <p:txBody>
-          <a:bodyPr wrap="square" rtlCol="0">
-            <a:spAutoFit/>
-          </a:bodyPr>
-          <a:lstStyle/>
-          <a:p>
-            <a:r>
-              <a:rPr lang="en-US" dirty="0" err="1"/>
-              <a:t>series_of_interest</a:t>
-            </a:r>
-            <a:endParaRPr lang="en-US" dirty="0"/>
-          </a:p>
-        </p:txBody>
-      </p:sp>
-      <p:sp>
-        <p:nvSpPr>
-          <p:cNvPr id="13" name="Flowchart: Internal Storage 12">
-            <a:extLst>
-              <a:ext uri="{FF2B5EF4-FFF2-40B4-BE49-F238E27FC236}">
-                <a16:creationId xmlns:a16="http://schemas.microsoft.com/office/drawing/2014/main" id="{B2FD2C2E-2149-40BF-97B0-9B1F0CF22683}"/>
-              </a:ext>
-            </a:extLst>
-          </p:cNvPr>
-          <p:cNvSpPr/>
-          <p:nvPr/>
-        </p:nvSpPr>
-        <p:spPr>
-          <a:xfrm>
-            <a:off x="4246166" y="2831811"/>
-            <a:ext cx="2575547" cy="350301"/>
-          </a:xfrm>
-          <a:prstGeom prst="flowChartInternalStorage">
-            <a:avLst/>
-          </a:prstGeom>
-        </p:spPr>
-        <p:style>
-          <a:lnRef idx="2">
-            <a:schemeClr val="accent3">
-              <a:shade val="50000"/>
-            </a:schemeClr>
-          </a:lnRef>
-          <a:fillRef idx="1">
-            <a:schemeClr val="accent3"/>
-          </a:fillRef>
-          <a:effectRef idx="0">
-            <a:schemeClr val="accent3"/>
-          </a:effectRef>
-          <a:fontRef idx="minor">
-            <a:schemeClr val="lt1"/>
-          </a:fontRef>
-        </p:style>
-        <p:txBody>
-          <a:bodyPr rtlCol="0" anchor="ctr"/>
-          <a:lstStyle/>
-          <a:p>
-            <a:pPr algn="ctr"/>
-            <a:r>
-              <a:rPr lang="en-US" dirty="0"/>
-              <a:t>df[‘job description’]</a:t>
-            </a:r>
-          </a:p>
-        </p:txBody>
-      </p:sp>
-      <p:sp>
-        <p:nvSpPr>
-          <p:cNvPr id="14" name="Flowchart: Alternate Process 13">
-            <a:extLst>
-              <a:ext uri="{FF2B5EF4-FFF2-40B4-BE49-F238E27FC236}">
-                <a16:creationId xmlns:a16="http://schemas.microsoft.com/office/drawing/2014/main" id="{362071C0-5F6E-470B-A2E9-4AA7D21BB5B3}"/>
-              </a:ext>
-            </a:extLst>
-          </p:cNvPr>
-          <p:cNvSpPr/>
-          <p:nvPr/>
-        </p:nvSpPr>
-        <p:spPr>
-          <a:xfrm>
-            <a:off x="4246165" y="4009759"/>
-            <a:ext cx="2575547" cy="487004"/>
-          </a:xfrm>
-          <a:prstGeom prst="flowChartAlternateProcess">
-            <a:avLst/>
-          </a:prstGeom>
-        </p:spPr>
-        <p:style>
-          <a:lnRef idx="2">
-            <a:schemeClr val="accent1">
-              <a:shade val="50000"/>
-            </a:schemeClr>
-          </a:lnRef>
-          <a:fillRef idx="1">
-            <a:schemeClr val="accent1"/>
-          </a:fillRef>
-          <a:effectRef idx="0">
-            <a:schemeClr val="accent1"/>
-          </a:effectRef>
-          <a:fontRef idx="minor">
-            <a:schemeClr val="lt1"/>
-          </a:fontRef>
-        </p:style>
-        <p:txBody>
-          <a:bodyPr rtlCol="0" anchor="ctr"/>
-          <a:lstStyle/>
-          <a:p>
-            <a:pPr algn="ctr"/>
-            <a:r>
-              <a:rPr lang="en-US" dirty="0" err="1"/>
-              <a:t>clean_terms_for_nlp</a:t>
-            </a:r>
-            <a:endParaRPr lang="en-US" dirty="0"/>
-          </a:p>
-        </p:txBody>
-      </p:sp>
-      <p:sp>
-        <p:nvSpPr>
-          <p:cNvPr id="16" name="TextBox 15">
-            <a:extLst>
-              <a:ext uri="{FF2B5EF4-FFF2-40B4-BE49-F238E27FC236}">
-                <a16:creationId xmlns:a16="http://schemas.microsoft.com/office/drawing/2014/main" id="{A8D2C342-58F0-48CC-9542-A3E941A1CC2E}"/>
-              </a:ext>
-            </a:extLst>
-          </p:cNvPr>
-          <p:cNvSpPr txBox="1"/>
-          <p:nvPr/>
-        </p:nvSpPr>
-        <p:spPr>
-          <a:xfrm>
-            <a:off x="1379189" y="4040732"/>
-            <a:ext cx="2485490" cy="419338"/>
-          </a:xfrm>
-          <a:prstGeom prst="flowChartInternalStorage">
-            <a:avLst/>
-          </a:prstGeom>
-        </p:spPr>
-        <p:style>
-          <a:lnRef idx="2">
-            <a:schemeClr val="accent3">
-              <a:shade val="50000"/>
-            </a:schemeClr>
-          </a:lnRef>
-          <a:fillRef idx="1">
-            <a:schemeClr val="accent3"/>
-          </a:fillRef>
-          <a:effectRef idx="0">
-            <a:schemeClr val="accent3"/>
-          </a:effectRef>
-          <a:fontRef idx="minor">
-            <a:schemeClr val="lt1"/>
-          </a:fontRef>
-        </p:style>
-        <p:txBody>
-          <a:bodyPr wrap="square" rtlCol="0">
-            <a:spAutoFit/>
-          </a:bodyPr>
-          <a:lstStyle/>
-          <a:p>
-            <a:r>
-              <a:rPr lang="en-US" dirty="0" err="1"/>
-              <a:t>series_of_interest</a:t>
-            </a:r>
-            <a:endParaRPr lang="en-US" dirty="0"/>
-          </a:p>
-        </p:txBody>
-      </p:sp>
-      <p:sp>
-        <p:nvSpPr>
-          <p:cNvPr id="17" name="Flowchart: Predefined Process 16">
-            <a:extLst>
-              <a:ext uri="{FF2B5EF4-FFF2-40B4-BE49-F238E27FC236}">
-                <a16:creationId xmlns:a16="http://schemas.microsoft.com/office/drawing/2014/main" id="{3BF1D7BC-0937-49CC-86EC-F91E3462A80A}"/>
-              </a:ext>
-            </a:extLst>
-          </p:cNvPr>
-          <p:cNvSpPr/>
-          <p:nvPr/>
-        </p:nvSpPr>
-        <p:spPr>
-          <a:xfrm>
-            <a:off x="7203198" y="4040732"/>
-            <a:ext cx="2494225" cy="350301"/>
-          </a:xfrm>
-          <a:prstGeom prst="flowChartPredefinedProcess">
-            <a:avLst/>
-          </a:prstGeom>
-        </p:spPr>
-        <p:style>
-          <a:lnRef idx="2">
-            <a:schemeClr val="accent6">
-              <a:shade val="50000"/>
-            </a:schemeClr>
-          </a:lnRef>
-          <a:fillRef idx="1">
-            <a:schemeClr val="accent6"/>
-          </a:fillRef>
-          <a:effectRef idx="0">
-            <a:schemeClr val="accent6"/>
-          </a:effectRef>
-          <a:fontRef idx="minor">
-            <a:schemeClr val="lt1"/>
-          </a:fontRef>
-        </p:style>
-        <p:txBody>
-          <a:bodyPr rtlCol="0" anchor="ctr"/>
-          <a:lstStyle/>
-          <a:p>
-            <a:pPr algn="ctr"/>
-            <a:r>
-              <a:rPr lang="en-US" dirty="0" err="1"/>
-              <a:t>terms_for_nlp</a:t>
-            </a:r>
-            <a:endParaRPr lang="en-US" dirty="0"/>
-          </a:p>
-        </p:txBody>
-      </p:sp>
-      <p:sp>
-        <p:nvSpPr>
-          <p:cNvPr id="18" name="Flowchart: Predefined Process 17">
-            <a:extLst>
-              <a:ext uri="{FF2B5EF4-FFF2-40B4-BE49-F238E27FC236}">
-                <a16:creationId xmlns:a16="http://schemas.microsoft.com/office/drawing/2014/main" id="{B97BAB4A-89D9-41F8-AAAC-575C39376910}"/>
-              </a:ext>
-            </a:extLst>
-          </p:cNvPr>
-          <p:cNvSpPr/>
-          <p:nvPr/>
-        </p:nvSpPr>
-        <p:spPr>
-          <a:xfrm>
-            <a:off x="7203198" y="3659458"/>
-            <a:ext cx="2485489" cy="350301"/>
-          </a:xfrm>
-          <a:prstGeom prst="flowChartPredefinedProcess">
-            <a:avLst/>
-          </a:prstGeom>
-          <a:solidFill>
-            <a:srgbClr val="7030A0"/>
-          </a:solidFill>
-        </p:spPr>
-        <p:style>
-          <a:lnRef idx="2">
-            <a:schemeClr val="accent6">
-              <a:shade val="50000"/>
-            </a:schemeClr>
-          </a:lnRef>
-          <a:fillRef idx="1">
-            <a:schemeClr val="accent6"/>
-          </a:fillRef>
-          <a:effectRef idx="0">
-            <a:schemeClr val="accent6"/>
-          </a:effectRef>
-          <a:fontRef idx="minor">
-            <a:schemeClr val="lt1"/>
-          </a:fontRef>
-        </p:style>
-        <p:txBody>
-          <a:bodyPr rtlCol="0" anchor="ctr"/>
-          <a:lstStyle/>
-          <a:p>
-            <a:pPr algn="ctr"/>
-            <a:r>
-              <a:rPr lang="en-US" dirty="0" err="1"/>
-              <a:t>term_fixes</a:t>
-            </a:r>
-            <a:endParaRPr lang="en-US" dirty="0"/>
-          </a:p>
-        </p:txBody>
-      </p:sp>
-      <p:sp>
-        <p:nvSpPr>
-          <p:cNvPr id="19" name="Flowchart: Predefined Process 18">
-            <a:extLst>
-              <a:ext uri="{FF2B5EF4-FFF2-40B4-BE49-F238E27FC236}">
-                <a16:creationId xmlns:a16="http://schemas.microsoft.com/office/drawing/2014/main" id="{B668F92D-FCEF-4D83-B0AC-75521890BCEB}"/>
-              </a:ext>
-            </a:extLst>
-          </p:cNvPr>
-          <p:cNvSpPr/>
-          <p:nvPr/>
-        </p:nvSpPr>
-        <p:spPr>
-          <a:xfrm>
-            <a:off x="7194462" y="4465069"/>
-            <a:ext cx="3067138" cy="350301"/>
-          </a:xfrm>
-          <a:prstGeom prst="flowChartPredefinedProcess">
-            <a:avLst/>
-          </a:prstGeom>
-        </p:spPr>
-        <p:style>
-          <a:lnRef idx="2">
-            <a:schemeClr val="accent6">
-              <a:shade val="50000"/>
-            </a:schemeClr>
-          </a:lnRef>
-          <a:fillRef idx="1">
-            <a:schemeClr val="accent6"/>
-          </a:fillRef>
-          <a:effectRef idx="0">
-            <a:schemeClr val="accent6"/>
-          </a:effectRef>
-          <a:fontRef idx="minor">
-            <a:schemeClr val="lt1"/>
-          </a:fontRef>
-        </p:style>
-        <p:txBody>
-          <a:bodyPr rtlCol="0" anchor="ctr"/>
-          <a:lstStyle/>
-          <a:p>
-            <a:pPr algn="ctr"/>
-            <a:r>
-              <a:rPr lang="en-US" dirty="0" err="1"/>
-              <a:t>additional_stopwords</a:t>
-            </a:r>
-            <a:endParaRPr lang="en-US" dirty="0"/>
-          </a:p>
-        </p:txBody>
-      </p:sp>
-      <p:sp>
-        <p:nvSpPr>
-          <p:cNvPr id="20" name="Flowchart: Alternate Process 19">
-            <a:extLst>
-              <a:ext uri="{FF2B5EF4-FFF2-40B4-BE49-F238E27FC236}">
-                <a16:creationId xmlns:a16="http://schemas.microsoft.com/office/drawing/2014/main" id="{8C765E03-2BA7-48AA-BE18-2E4ED0AA51E3}"/>
-              </a:ext>
-            </a:extLst>
-          </p:cNvPr>
-          <p:cNvSpPr/>
-          <p:nvPr/>
-        </p:nvSpPr>
-        <p:spPr>
-          <a:xfrm>
-            <a:off x="4246164" y="5628102"/>
-            <a:ext cx="2575547" cy="487004"/>
-          </a:xfrm>
-          <a:prstGeom prst="flowChartAlternateProcess">
-            <a:avLst/>
-          </a:prstGeom>
-        </p:spPr>
-        <p:style>
-          <a:lnRef idx="2">
-            <a:schemeClr val="accent1">
-              <a:shade val="50000"/>
-            </a:schemeClr>
-          </a:lnRef>
-          <a:fillRef idx="1">
-            <a:schemeClr val="accent1"/>
-          </a:fillRef>
-          <a:effectRef idx="0">
-            <a:schemeClr val="accent1"/>
-          </a:effectRef>
-          <a:fontRef idx="minor">
-            <a:schemeClr val="lt1"/>
-          </a:fontRef>
-        </p:style>
-        <p:txBody>
-          <a:bodyPr rtlCol="0" anchor="ctr"/>
-          <a:lstStyle/>
-          <a:p>
-            <a:pPr algn="ctr"/>
-            <a:r>
-              <a:rPr lang="en-US" dirty="0" err="1"/>
-              <a:t>nlp_skill_lists</a:t>
-            </a:r>
-            <a:endParaRPr lang="en-US" dirty="0"/>
-          </a:p>
-        </p:txBody>
-      </p:sp>
-      <p:sp>
-        <p:nvSpPr>
-          <p:cNvPr id="21" name="Flowchart: Predefined Process 20">
-            <a:extLst>
-              <a:ext uri="{FF2B5EF4-FFF2-40B4-BE49-F238E27FC236}">
-                <a16:creationId xmlns:a16="http://schemas.microsoft.com/office/drawing/2014/main" id="{CCA7D4D5-6596-4698-82AA-DC7D58389EE6}"/>
-              </a:ext>
-            </a:extLst>
-          </p:cNvPr>
-          <p:cNvSpPr/>
-          <p:nvPr/>
-        </p:nvSpPr>
-        <p:spPr>
-          <a:xfrm>
-            <a:off x="824254" y="5696453"/>
-            <a:ext cx="3067138" cy="350301"/>
-          </a:xfrm>
-          <a:prstGeom prst="flowChartPredefinedProcess">
-            <a:avLst/>
-          </a:prstGeom>
-        </p:spPr>
-        <p:style>
-          <a:lnRef idx="2">
-            <a:schemeClr val="accent6">
-              <a:shade val="50000"/>
-            </a:schemeClr>
-          </a:lnRef>
-          <a:fillRef idx="1">
-            <a:schemeClr val="accent6"/>
-          </a:fillRef>
-          <a:effectRef idx="0">
-            <a:schemeClr val="accent6"/>
-          </a:effectRef>
-          <a:fontRef idx="minor">
-            <a:schemeClr val="lt1"/>
-          </a:fontRef>
-        </p:style>
-        <p:txBody>
-          <a:bodyPr rtlCol="0" anchor="ctr"/>
-          <a:lstStyle/>
-          <a:p>
-            <a:pPr algn="ctr"/>
-            <a:r>
-              <a:rPr lang="en-US" dirty="0" err="1"/>
-              <a:t>additional_stopwords</a:t>
-            </a:r>
-            <a:endParaRPr lang="en-US" dirty="0"/>
-          </a:p>
-        </p:txBody>
-      </p:sp>
-      <p:sp>
-        <p:nvSpPr>
-          <p:cNvPr id="22" name="Flowchart: Predefined Process 21">
-            <a:extLst>
-              <a:ext uri="{FF2B5EF4-FFF2-40B4-BE49-F238E27FC236}">
-                <a16:creationId xmlns:a16="http://schemas.microsoft.com/office/drawing/2014/main" id="{5CB64379-9540-4BF0-A788-C280CE1A2C0F}"/>
-              </a:ext>
-            </a:extLst>
-          </p:cNvPr>
-          <p:cNvSpPr/>
-          <p:nvPr/>
-        </p:nvSpPr>
-        <p:spPr>
-          <a:xfrm>
-            <a:off x="7176483" y="5579358"/>
-            <a:ext cx="3067138" cy="350301"/>
-          </a:xfrm>
-          <a:prstGeom prst="flowChartPredefinedProcess">
-            <a:avLst/>
-          </a:prstGeom>
-        </p:spPr>
-        <p:style>
-          <a:lnRef idx="2">
-            <a:schemeClr val="accent6">
-              <a:shade val="50000"/>
-            </a:schemeClr>
-          </a:lnRef>
-          <a:fillRef idx="1">
-            <a:schemeClr val="accent6"/>
-          </a:fillRef>
-          <a:effectRef idx="0">
-            <a:schemeClr val="accent6"/>
-          </a:effectRef>
-          <a:fontRef idx="minor">
-            <a:schemeClr val="lt1"/>
-          </a:fontRef>
-        </p:style>
-        <p:txBody>
-          <a:bodyPr rtlCol="0" anchor="ctr"/>
-          <a:lstStyle/>
-          <a:p>
-            <a:pPr algn="ctr"/>
-            <a:r>
-              <a:rPr lang="en-US" dirty="0"/>
-              <a:t>skill and subtopic lists</a:t>
-            </a:r>
-          </a:p>
-        </p:txBody>
-      </p:sp>
-      <p:sp>
-        <p:nvSpPr>
-          <p:cNvPr id="23" name="TextBox 22">
-            <a:extLst>
-              <a:ext uri="{FF2B5EF4-FFF2-40B4-BE49-F238E27FC236}">
-                <a16:creationId xmlns:a16="http://schemas.microsoft.com/office/drawing/2014/main" id="{F33F8169-18B0-4527-BA19-CB0AA397B1BB}"/>
-              </a:ext>
-            </a:extLst>
-          </p:cNvPr>
-          <p:cNvSpPr txBox="1"/>
-          <p:nvPr/>
-        </p:nvSpPr>
-        <p:spPr>
-          <a:xfrm>
-            <a:off x="8532779" y="5857613"/>
-            <a:ext cx="343364" cy="369332"/>
+            <a:off x="2894705" y="6627167"/>
+            <a:ext cx="6402587" cy="461665"/>
           </a:xfrm>
           <a:prstGeom prst="rect">
             <a:avLst/>
@@ -4395,588 +4590,16 @@
           <a:lstStyle/>
           <a:p>
             <a:r>
-              <a:rPr lang="en-US" dirty="0"/>
-              <a:t>…</a:t>
-            </a:r>
-          </a:p>
-        </p:txBody>
-      </p:sp>
-      <p:sp>
-        <p:nvSpPr>
-          <p:cNvPr id="24" name="Flowchart: Alternate Process 23">
-            <a:extLst>
-              <a:ext uri="{FF2B5EF4-FFF2-40B4-BE49-F238E27FC236}">
-                <a16:creationId xmlns:a16="http://schemas.microsoft.com/office/drawing/2014/main" id="{AEA92B93-F4F5-45E7-95A2-D54FA6FBF7CC}"/>
-              </a:ext>
-            </a:extLst>
-          </p:cNvPr>
-          <p:cNvSpPr/>
-          <p:nvPr/>
-        </p:nvSpPr>
-        <p:spPr>
-          <a:xfrm>
-            <a:off x="4246164" y="6906061"/>
-            <a:ext cx="2575547" cy="487004"/>
-          </a:xfrm>
-          <a:prstGeom prst="flowChartAlternateProcess">
-            <a:avLst/>
-          </a:prstGeom>
-        </p:spPr>
-        <p:style>
-          <a:lnRef idx="2">
-            <a:schemeClr val="accent1">
-              <a:shade val="50000"/>
-            </a:schemeClr>
-          </a:lnRef>
-          <a:fillRef idx="1">
-            <a:schemeClr val="accent1"/>
-          </a:fillRef>
-          <a:effectRef idx="0">
-            <a:schemeClr val="accent1"/>
-          </a:effectRef>
-          <a:fontRef idx="minor">
-            <a:schemeClr val="lt1"/>
-          </a:fontRef>
-        </p:style>
-        <p:txBody>
-          <a:bodyPr rtlCol="0" anchor="ctr"/>
-          <a:lstStyle/>
-          <a:p>
-            <a:pPr algn="ctr"/>
-            <a:r>
-              <a:rPr lang="en-US" dirty="0" err="1"/>
-              <a:t>nlp_count_n_grams</a:t>
-            </a:r>
-            <a:endParaRPr lang="en-US" dirty="0"/>
-          </a:p>
-        </p:txBody>
-      </p:sp>
-      <p:sp>
-        <p:nvSpPr>
-          <p:cNvPr id="25" name="TextBox 24">
-            <a:extLst>
-              <a:ext uri="{FF2B5EF4-FFF2-40B4-BE49-F238E27FC236}">
-                <a16:creationId xmlns:a16="http://schemas.microsoft.com/office/drawing/2014/main" id="{1FD4FB1B-7AB6-4625-B9E0-22A20A524D7C}"/>
-              </a:ext>
-            </a:extLst>
-          </p:cNvPr>
-          <p:cNvSpPr txBox="1"/>
-          <p:nvPr/>
-        </p:nvSpPr>
-        <p:spPr>
-          <a:xfrm>
-            <a:off x="7290034" y="6976231"/>
-            <a:ext cx="2485490" cy="419338"/>
-          </a:xfrm>
-          <a:prstGeom prst="flowChartInternalStorage">
-            <a:avLst/>
-          </a:prstGeom>
-        </p:spPr>
-        <p:style>
-          <a:lnRef idx="2">
-            <a:schemeClr val="accent3">
-              <a:shade val="50000"/>
-            </a:schemeClr>
-          </a:lnRef>
-          <a:fillRef idx="1">
-            <a:schemeClr val="accent3"/>
-          </a:fillRef>
-          <a:effectRef idx="0">
-            <a:schemeClr val="accent3"/>
-          </a:effectRef>
-          <a:fontRef idx="minor">
-            <a:schemeClr val="lt1"/>
-          </a:fontRef>
-        </p:style>
-        <p:txBody>
-          <a:bodyPr wrap="square" rtlCol="0">
-            <a:spAutoFit/>
-          </a:bodyPr>
-          <a:lstStyle/>
-          <a:p>
-            <a:r>
-              <a:rPr lang="en-US" dirty="0" err="1"/>
-              <a:t>n_grams</a:t>
-            </a:r>
-            <a:endParaRPr lang="en-US" dirty="0"/>
-          </a:p>
-        </p:txBody>
-      </p:sp>
-      <p:sp>
-        <p:nvSpPr>
-          <p:cNvPr id="26" name="Flowchart: Predefined Process 25">
-            <a:extLst>
-              <a:ext uri="{FF2B5EF4-FFF2-40B4-BE49-F238E27FC236}">
-                <a16:creationId xmlns:a16="http://schemas.microsoft.com/office/drawing/2014/main" id="{990EC00D-A93F-4DAE-882C-A8CF7525A3EC}"/>
-              </a:ext>
-            </a:extLst>
-          </p:cNvPr>
-          <p:cNvSpPr/>
-          <p:nvPr/>
-        </p:nvSpPr>
-        <p:spPr>
-          <a:xfrm>
-            <a:off x="1110710" y="6976231"/>
-            <a:ext cx="2494225" cy="350301"/>
-          </a:xfrm>
-          <a:prstGeom prst="flowChartPredefinedProcess">
-            <a:avLst/>
-          </a:prstGeom>
-        </p:spPr>
-        <p:style>
-          <a:lnRef idx="2">
-            <a:schemeClr val="accent6">
-              <a:shade val="50000"/>
-            </a:schemeClr>
-          </a:lnRef>
-          <a:fillRef idx="1">
-            <a:schemeClr val="accent6"/>
-          </a:fillRef>
-          <a:effectRef idx="0">
-            <a:schemeClr val="accent6"/>
-          </a:effectRef>
-          <a:fontRef idx="minor">
-            <a:schemeClr val="lt1"/>
-          </a:fontRef>
-        </p:style>
-        <p:txBody>
-          <a:bodyPr rtlCol="0" anchor="ctr"/>
-          <a:lstStyle/>
-          <a:p>
-            <a:pPr algn="ctr"/>
-            <a:r>
-              <a:rPr lang="en-US" dirty="0" err="1"/>
-              <a:t>terms_for_nlp</a:t>
-            </a:r>
-            <a:endParaRPr lang="en-US" dirty="0"/>
-          </a:p>
-        </p:txBody>
-      </p:sp>
-      <p:sp>
-        <p:nvSpPr>
-          <p:cNvPr id="28" name="Flowchart: Alternate Process 27">
-            <a:extLst>
-              <a:ext uri="{FF2B5EF4-FFF2-40B4-BE49-F238E27FC236}">
-                <a16:creationId xmlns:a16="http://schemas.microsoft.com/office/drawing/2014/main" id="{0002F5BC-0492-4562-8161-55253986DB98}"/>
-              </a:ext>
-            </a:extLst>
-          </p:cNvPr>
-          <p:cNvSpPr/>
-          <p:nvPr/>
-        </p:nvSpPr>
-        <p:spPr>
-          <a:xfrm>
-            <a:off x="4246164" y="7910703"/>
-            <a:ext cx="2575547" cy="487004"/>
-          </a:xfrm>
-          <a:prstGeom prst="flowChartAlternateProcess">
-            <a:avLst/>
-          </a:prstGeom>
-        </p:spPr>
-        <p:style>
-          <a:lnRef idx="2">
-            <a:schemeClr val="accent1">
-              <a:shade val="50000"/>
-            </a:schemeClr>
-          </a:lnRef>
-          <a:fillRef idx="1">
-            <a:schemeClr val="accent1"/>
-          </a:fillRef>
-          <a:effectRef idx="0">
-            <a:schemeClr val="accent1"/>
-          </a:effectRef>
-          <a:fontRef idx="minor">
-            <a:schemeClr val="lt1"/>
-          </a:fontRef>
-        </p:style>
-        <p:txBody>
-          <a:bodyPr rtlCol="0" anchor="ctr"/>
-          <a:lstStyle/>
-          <a:p>
-            <a:pPr algn="ctr"/>
-            <a:r>
-              <a:rPr lang="en-US" dirty="0" err="1"/>
-              <a:t>viz_indeed_metdata</a:t>
-            </a:r>
-            <a:endParaRPr lang="en-US" dirty="0"/>
-          </a:p>
-        </p:txBody>
-      </p:sp>
-      <p:sp>
-        <p:nvSpPr>
-          <p:cNvPr id="29" name="Flowchart: Internal Storage 28">
-            <a:extLst>
-              <a:ext uri="{FF2B5EF4-FFF2-40B4-BE49-F238E27FC236}">
-                <a16:creationId xmlns:a16="http://schemas.microsoft.com/office/drawing/2014/main" id="{EC0E4911-D368-46B9-932E-ED13975A1A9A}"/>
-              </a:ext>
-            </a:extLst>
-          </p:cNvPr>
-          <p:cNvSpPr/>
-          <p:nvPr/>
-        </p:nvSpPr>
-        <p:spPr>
-          <a:xfrm>
-            <a:off x="2682453" y="7979054"/>
-            <a:ext cx="1023834" cy="350301"/>
-          </a:xfrm>
-          <a:prstGeom prst="flowChartInternalStorage">
-            <a:avLst/>
-          </a:prstGeom>
-        </p:spPr>
-        <p:style>
-          <a:lnRef idx="2">
-            <a:schemeClr val="accent3">
-              <a:shade val="50000"/>
-            </a:schemeClr>
-          </a:lnRef>
-          <a:fillRef idx="1">
-            <a:schemeClr val="accent3"/>
-          </a:fillRef>
-          <a:effectRef idx="0">
-            <a:schemeClr val="accent3"/>
-          </a:effectRef>
-          <a:fontRef idx="minor">
-            <a:schemeClr val="lt1"/>
-          </a:fontRef>
-        </p:style>
-        <p:txBody>
-          <a:bodyPr rtlCol="0" anchor="ctr"/>
-          <a:lstStyle/>
-          <a:p>
-            <a:pPr algn="ctr"/>
-            <a:r>
-              <a:rPr lang="en-US" dirty="0"/>
-              <a:t>df</a:t>
-            </a:r>
-          </a:p>
-        </p:txBody>
-      </p:sp>
-      <p:sp>
-        <p:nvSpPr>
-          <p:cNvPr id="30" name="Flowchart: Alternate Process 29">
-            <a:extLst>
-              <a:ext uri="{FF2B5EF4-FFF2-40B4-BE49-F238E27FC236}">
-                <a16:creationId xmlns:a16="http://schemas.microsoft.com/office/drawing/2014/main" id="{8A7CE71C-B2D1-49D5-8312-F84D7B96D409}"/>
-              </a:ext>
-            </a:extLst>
-          </p:cNvPr>
-          <p:cNvSpPr/>
-          <p:nvPr/>
-        </p:nvSpPr>
-        <p:spPr>
-          <a:xfrm>
-            <a:off x="4246164" y="8915345"/>
-            <a:ext cx="2575547" cy="487004"/>
-          </a:xfrm>
-          <a:prstGeom prst="flowChartAlternateProcess">
-            <a:avLst/>
-          </a:prstGeom>
-        </p:spPr>
-        <p:style>
-          <a:lnRef idx="2">
-            <a:schemeClr val="accent1">
-              <a:shade val="50000"/>
-            </a:schemeClr>
-          </a:lnRef>
-          <a:fillRef idx="1">
-            <a:schemeClr val="accent1"/>
-          </a:fillRef>
-          <a:effectRef idx="0">
-            <a:schemeClr val="accent1"/>
-          </a:effectRef>
-          <a:fontRef idx="minor">
-            <a:schemeClr val="lt1"/>
-          </a:fontRef>
-        </p:style>
-        <p:txBody>
-          <a:bodyPr rtlCol="0" anchor="ctr"/>
-          <a:lstStyle/>
-          <a:p>
-            <a:pPr algn="ctr"/>
-            <a:r>
-              <a:rPr lang="en-US" dirty="0" err="1"/>
-              <a:t>viz_word_clouds</a:t>
-            </a:r>
-            <a:endParaRPr lang="en-US" dirty="0"/>
-          </a:p>
-        </p:txBody>
-      </p:sp>
-      <p:sp>
-        <p:nvSpPr>
-          <p:cNvPr id="31" name="TextBox 30">
-            <a:extLst>
-              <a:ext uri="{FF2B5EF4-FFF2-40B4-BE49-F238E27FC236}">
-                <a16:creationId xmlns:a16="http://schemas.microsoft.com/office/drawing/2014/main" id="{7FE73C38-E4EF-443A-8729-AFB80AE5F1F7}"/>
-              </a:ext>
-            </a:extLst>
-          </p:cNvPr>
-          <p:cNvSpPr txBox="1"/>
-          <p:nvPr/>
-        </p:nvSpPr>
-        <p:spPr>
-          <a:xfrm>
-            <a:off x="1379189" y="8689683"/>
-            <a:ext cx="2485490" cy="419338"/>
-          </a:xfrm>
-          <a:prstGeom prst="flowChartInternalStorage">
-            <a:avLst/>
-          </a:prstGeom>
-        </p:spPr>
-        <p:style>
-          <a:lnRef idx="2">
-            <a:schemeClr val="accent3">
-              <a:shade val="50000"/>
-            </a:schemeClr>
-          </a:lnRef>
-          <a:fillRef idx="1">
-            <a:schemeClr val="accent3"/>
-          </a:fillRef>
-          <a:effectRef idx="0">
-            <a:schemeClr val="accent3"/>
-          </a:effectRef>
-          <a:fontRef idx="minor">
-            <a:schemeClr val="lt1"/>
-          </a:fontRef>
-        </p:style>
-        <p:txBody>
-          <a:bodyPr wrap="square" rtlCol="0">
-            <a:spAutoFit/>
-          </a:bodyPr>
-          <a:lstStyle/>
-          <a:p>
-            <a:r>
-              <a:rPr lang="en-US" dirty="0" err="1"/>
-              <a:t>series_of_interest</a:t>
-            </a:r>
-            <a:endParaRPr lang="en-US" dirty="0"/>
-          </a:p>
-        </p:txBody>
-      </p:sp>
-      <p:sp>
-        <p:nvSpPr>
-          <p:cNvPr id="32" name="Flowchart: Predefined Process 31">
-            <a:extLst>
-              <a:ext uri="{FF2B5EF4-FFF2-40B4-BE49-F238E27FC236}">
-                <a16:creationId xmlns:a16="http://schemas.microsoft.com/office/drawing/2014/main" id="{333D3F9F-CE2F-471C-9091-97873C4BDAAB}"/>
-              </a:ext>
-            </a:extLst>
-          </p:cNvPr>
-          <p:cNvSpPr/>
-          <p:nvPr/>
-        </p:nvSpPr>
-        <p:spPr>
-          <a:xfrm>
-            <a:off x="1370454" y="9164883"/>
-            <a:ext cx="2494225" cy="350301"/>
-          </a:xfrm>
-          <a:prstGeom prst="flowChartPredefinedProcess">
-            <a:avLst/>
-          </a:prstGeom>
-        </p:spPr>
-        <p:style>
-          <a:lnRef idx="2">
-            <a:schemeClr val="accent6">
-              <a:shade val="50000"/>
-            </a:schemeClr>
-          </a:lnRef>
-          <a:fillRef idx="1">
-            <a:schemeClr val="accent6"/>
-          </a:fillRef>
-          <a:effectRef idx="0">
-            <a:schemeClr val="accent6"/>
-          </a:effectRef>
-          <a:fontRef idx="minor">
-            <a:schemeClr val="lt1"/>
-          </a:fontRef>
-        </p:style>
-        <p:txBody>
-          <a:bodyPr rtlCol="0" anchor="ctr"/>
-          <a:lstStyle/>
-          <a:p>
-            <a:pPr algn="ctr"/>
-            <a:r>
-              <a:rPr lang="en-US" dirty="0" err="1"/>
-              <a:t>terms_for_nlp</a:t>
-            </a:r>
-            <a:endParaRPr lang="en-US" dirty="0"/>
-          </a:p>
-        </p:txBody>
-      </p:sp>
-      <p:sp>
-        <p:nvSpPr>
-          <p:cNvPr id="33" name="Flowchart: Alternate Process 32">
-            <a:extLst>
-              <a:ext uri="{FF2B5EF4-FFF2-40B4-BE49-F238E27FC236}">
-                <a16:creationId xmlns:a16="http://schemas.microsoft.com/office/drawing/2014/main" id="{BAE9F1F3-CA7A-44CD-8B59-84A1CC843A65}"/>
-              </a:ext>
-            </a:extLst>
-          </p:cNvPr>
-          <p:cNvSpPr/>
-          <p:nvPr/>
-        </p:nvSpPr>
-        <p:spPr>
-          <a:xfrm>
-            <a:off x="4246163" y="9919987"/>
-            <a:ext cx="2575547" cy="487004"/>
-          </a:xfrm>
-          <a:prstGeom prst="flowChartAlternateProcess">
-            <a:avLst/>
-          </a:prstGeom>
-        </p:spPr>
-        <p:style>
-          <a:lnRef idx="2">
-            <a:schemeClr val="accent1">
-              <a:shade val="50000"/>
-            </a:schemeClr>
-          </a:lnRef>
-          <a:fillRef idx="1">
-            <a:schemeClr val="accent1"/>
-          </a:fillRef>
-          <a:effectRef idx="0">
-            <a:schemeClr val="accent1"/>
-          </a:effectRef>
-          <a:fontRef idx="minor">
-            <a:schemeClr val="lt1"/>
-          </a:fontRef>
-        </p:style>
-        <p:txBody>
-          <a:bodyPr rtlCol="0" anchor="ctr"/>
-          <a:lstStyle/>
-          <a:p>
-            <a:pPr algn="ctr"/>
-            <a:r>
-              <a:rPr lang="en-US" dirty="0" err="1"/>
-              <a:t>viz_n_grams</a:t>
-            </a:r>
-            <a:endParaRPr lang="en-US" dirty="0"/>
-          </a:p>
-        </p:txBody>
-      </p:sp>
-      <p:sp>
-        <p:nvSpPr>
-          <p:cNvPr id="34" name="TextBox 33">
-            <a:extLst>
-              <a:ext uri="{FF2B5EF4-FFF2-40B4-BE49-F238E27FC236}">
-                <a16:creationId xmlns:a16="http://schemas.microsoft.com/office/drawing/2014/main" id="{9F0F2FFC-63A4-42BF-85FD-B20F82797DBB}"/>
-              </a:ext>
-            </a:extLst>
-          </p:cNvPr>
-          <p:cNvSpPr txBox="1"/>
-          <p:nvPr/>
-        </p:nvSpPr>
-        <p:spPr>
-          <a:xfrm>
-            <a:off x="7363434" y="7979054"/>
-            <a:ext cx="2165016" cy="369332"/>
-          </a:xfrm>
-          <a:prstGeom prst="rect">
-            <a:avLst/>
-          </a:prstGeom>
-          <a:noFill/>
-        </p:spPr>
-        <p:txBody>
-          <a:bodyPr wrap="none" rtlCol="0">
-            <a:spAutoFit/>
-          </a:bodyPr>
-          <a:lstStyle/>
-          <a:p>
-            <a:r>
-              <a:rPr lang="en-US" dirty="0"/>
-              <a:t>&lt;direct visualization&gt;</a:t>
-            </a:r>
-          </a:p>
-        </p:txBody>
-      </p:sp>
-      <p:sp>
-        <p:nvSpPr>
-          <p:cNvPr id="35" name="TextBox 34">
-            <a:extLst>
-              <a:ext uri="{FF2B5EF4-FFF2-40B4-BE49-F238E27FC236}">
-                <a16:creationId xmlns:a16="http://schemas.microsoft.com/office/drawing/2014/main" id="{F855CFFB-E3B1-45A5-96DB-A5D42AA8D945}"/>
-              </a:ext>
-            </a:extLst>
-          </p:cNvPr>
-          <p:cNvSpPr txBox="1"/>
-          <p:nvPr/>
-        </p:nvSpPr>
-        <p:spPr>
-          <a:xfrm>
-            <a:off x="7336726" y="8931871"/>
-            <a:ext cx="2165016" cy="369332"/>
-          </a:xfrm>
-          <a:prstGeom prst="rect">
-            <a:avLst/>
-          </a:prstGeom>
-          <a:noFill/>
-        </p:spPr>
-        <p:txBody>
-          <a:bodyPr wrap="none" rtlCol="0">
-            <a:spAutoFit/>
-          </a:bodyPr>
-          <a:lstStyle/>
-          <a:p>
-            <a:r>
-              <a:rPr lang="en-US" dirty="0"/>
-              <a:t>&lt;direct visualization&gt;</a:t>
-            </a:r>
-          </a:p>
-        </p:txBody>
-      </p:sp>
-      <p:sp>
-        <p:nvSpPr>
-          <p:cNvPr id="36" name="TextBox 35">
-            <a:extLst>
-              <a:ext uri="{FF2B5EF4-FFF2-40B4-BE49-F238E27FC236}">
-                <a16:creationId xmlns:a16="http://schemas.microsoft.com/office/drawing/2014/main" id="{6631A04F-4424-45AF-9CCD-4874663DBA43}"/>
-              </a:ext>
-            </a:extLst>
-          </p:cNvPr>
-          <p:cNvSpPr txBox="1"/>
-          <p:nvPr/>
-        </p:nvSpPr>
-        <p:spPr>
-          <a:xfrm>
-            <a:off x="7326954" y="9987653"/>
-            <a:ext cx="2450046" cy="419338"/>
-          </a:xfrm>
-          <a:prstGeom prst="flowChartInternalStorage">
-            <a:avLst/>
-          </a:prstGeom>
-        </p:spPr>
-        <p:style>
-          <a:lnRef idx="2">
-            <a:schemeClr val="accent3">
-              <a:shade val="50000"/>
-            </a:schemeClr>
-          </a:lnRef>
-          <a:fillRef idx="1">
-            <a:schemeClr val="accent3"/>
-          </a:fillRef>
-          <a:effectRef idx="0">
-            <a:schemeClr val="accent3"/>
-          </a:effectRef>
-          <a:fontRef idx="minor">
-            <a:schemeClr val="lt1"/>
-          </a:fontRef>
-        </p:style>
-        <p:txBody>
-          <a:bodyPr wrap="square" rtlCol="0">
-            <a:spAutoFit/>
-          </a:bodyPr>
-          <a:lstStyle/>
-          <a:p>
-            <a:r>
-              <a:rPr lang="en-US" dirty="0" err="1"/>
-              <a:t>df_jobs_raw</a:t>
-            </a:r>
-            <a:endParaRPr lang="en-US" dirty="0"/>
+              <a:rPr lang="en-US" sz="2400" dirty="0"/>
+              <a:t>**Data is exactly what is brought in from the CSVs</a:t>
+            </a:r>
           </a:p>
         </p:txBody>
       </p:sp>
     </p:spTree>
     <p:extLst>
       <p:ext uri="{BB962C8B-B14F-4D97-AF65-F5344CB8AC3E}">
-        <p14:creationId xmlns:p14="http://schemas.microsoft.com/office/powerpoint/2010/main" val="398556617"/>
+        <p14:creationId xmlns:p14="http://schemas.microsoft.com/office/powerpoint/2010/main" val="2666931530"/>
       </p:ext>
     </p:extLst>
   </p:cSld>
@@ -5005,10 +4628,10 @@
       </p:grpSpPr>
       <p:sp>
         <p:nvSpPr>
-          <p:cNvPr id="37" name="Flowchart: Internal Storage 36">
+          <p:cNvPr id="3" name="Flowchart: Internal Storage 2">
             <a:extLst>
               <a:ext uri="{FF2B5EF4-FFF2-40B4-BE49-F238E27FC236}">
-                <a16:creationId xmlns:a16="http://schemas.microsoft.com/office/drawing/2014/main" id="{B899CFF5-5C3B-454F-9483-021D8C20CBC7}"/>
+                <a16:creationId xmlns:a16="http://schemas.microsoft.com/office/drawing/2014/main" id="{2FA25D71-6306-455E-B846-6D7DC20BE7FD}"/>
               </a:ext>
             </a:extLst>
           </p:cNvPr>
@@ -5017,8 +4640,8 @@
         </p:nvSpPr>
         <p:spPr>
           <a:xfrm>
-            <a:off x="3340935" y="228179"/>
-            <a:ext cx="5510130" cy="1789307"/>
+            <a:off x="4330556" y="271722"/>
+            <a:ext cx="3530888" cy="1789307"/>
           </a:xfrm>
           <a:prstGeom prst="flowChartInternalStorage">
             <a:avLst/>
@@ -5047,17 +4670,17 @@
             <a:pPr algn="ctr"/>
             <a:r>
               <a:rPr lang="en-US" sz="11500" dirty="0"/>
-              <a:t>df_raw</a:t>
+              <a:t>df</a:t>
             </a:r>
           </a:p>
         </p:txBody>
       </p:sp>
       <p:pic>
         <p:nvPicPr>
-          <p:cNvPr id="38" name="Picture 37">
+          <p:cNvPr id="6" name="Picture 5">
             <a:extLst>
               <a:ext uri="{FF2B5EF4-FFF2-40B4-BE49-F238E27FC236}">
-                <a16:creationId xmlns:a16="http://schemas.microsoft.com/office/drawing/2014/main" id="{5DC27DDC-8171-4CF5-96BF-A6733484AF66}"/>
+                <a16:creationId xmlns:a16="http://schemas.microsoft.com/office/drawing/2014/main" id="{E993F570-629C-48C3-977B-278A8B3416CB}"/>
               </a:ext>
             </a:extLst>
           </p:cNvPr>
@@ -5074,8 +4697,8 @@
         </p:blipFill>
         <p:spPr>
           <a:xfrm>
-            <a:off x="442912" y="2399619"/>
-            <a:ext cx="11306175" cy="3952875"/>
+            <a:off x="742950" y="2377848"/>
+            <a:ext cx="10706100" cy="4257675"/>
           </a:xfrm>
           <a:prstGeom prst="rect">
             <a:avLst/>
@@ -5084,10 +4707,10 @@
       </p:pic>
       <p:sp>
         <p:nvSpPr>
-          <p:cNvPr id="2" name="TextBox 1">
+          <p:cNvPr id="8" name="TextBox 7">
             <a:extLst>
               <a:ext uri="{FF2B5EF4-FFF2-40B4-BE49-F238E27FC236}">
-                <a16:creationId xmlns:a16="http://schemas.microsoft.com/office/drawing/2014/main" id="{84926692-43D8-4FF9-B995-0392C1125FB8}"/>
+                <a16:creationId xmlns:a16="http://schemas.microsoft.com/office/drawing/2014/main" id="{169B2A1F-660A-41AE-8A3C-7C19219BD98D}"/>
               </a:ext>
             </a:extLst>
           </p:cNvPr>
@@ -5096,8 +4719,8 @@
         </p:nvSpPr>
         <p:spPr>
           <a:xfrm>
-            <a:off x="2894705" y="6627167"/>
-            <a:ext cx="6402587" cy="461665"/>
+            <a:off x="1978430" y="6894286"/>
+            <a:ext cx="8235140" cy="461665"/>
           </a:xfrm>
           <a:prstGeom prst="rect">
             <a:avLst/>
@@ -5112,7 +4735,15 @@
           <a:p>
             <a:r>
               <a:rPr lang="en-US" sz="2400" dirty="0"/>
-              <a:t>**Data is exactly what is brought in from the CSVs</a:t>
+              <a:t>**Unnecessary fields are dropped, and </a:t>
+            </a:r>
+            <a:r>
+              <a:rPr lang="en-US" sz="2400" dirty="0" err="1"/>
+              <a:t>csv_name</a:t>
+            </a:r>
+            <a:r>
+              <a:rPr lang="en-US" sz="2400" dirty="0"/>
+              <a:t> field is parsed </a:t>
             </a:r>
           </a:p>
         </p:txBody>
@@ -5120,7 +4751,7 @@
     </p:spTree>
     <p:extLst>
       <p:ext uri="{BB962C8B-B14F-4D97-AF65-F5344CB8AC3E}">
-        <p14:creationId xmlns:p14="http://schemas.microsoft.com/office/powerpoint/2010/main" val="2666931530"/>
+        <p14:creationId xmlns:p14="http://schemas.microsoft.com/office/powerpoint/2010/main" val="2341473965"/>
       </p:ext>
     </p:extLst>
   </p:cSld>
@@ -5149,10 +4780,10 @@
       </p:grpSpPr>
       <p:sp>
         <p:nvSpPr>
-          <p:cNvPr id="3" name="Flowchart: Internal Storage 2">
+          <p:cNvPr id="5" name="Flowchart: Internal Storage 4">
             <a:extLst>
               <a:ext uri="{FF2B5EF4-FFF2-40B4-BE49-F238E27FC236}">
-                <a16:creationId xmlns:a16="http://schemas.microsoft.com/office/drawing/2014/main" id="{2FA25D71-6306-455E-B846-6D7DC20BE7FD}"/>
+                <a16:creationId xmlns:a16="http://schemas.microsoft.com/office/drawing/2014/main" id="{A9EBC777-6EF3-451B-83EA-0619FF8F61E2}"/>
               </a:ext>
             </a:extLst>
           </p:cNvPr>
@@ -5161,8 +4792,8 @@
         </p:nvSpPr>
         <p:spPr>
           <a:xfrm>
-            <a:off x="4330556" y="271722"/>
-            <a:ext cx="3530888" cy="1789307"/>
+            <a:off x="696686" y="271722"/>
+            <a:ext cx="10580914" cy="1789307"/>
           </a:xfrm>
           <a:prstGeom prst="flowChartInternalStorage">
             <a:avLst/>
@@ -5190,18 +4821,18 @@
           <a:p>
             <a:pPr algn="ctr"/>
             <a:r>
-              <a:rPr lang="en-US" sz="11500" dirty="0"/>
-              <a:t>df</a:t>
+              <a:rPr lang="en-US" sz="8800" dirty="0"/>
+              <a:t>series_of_interest</a:t>
             </a:r>
           </a:p>
         </p:txBody>
       </p:sp>
       <p:pic>
         <p:nvPicPr>
-          <p:cNvPr id="6" name="Picture 5">
+          <p:cNvPr id="7" name="Picture 6">
             <a:extLst>
               <a:ext uri="{FF2B5EF4-FFF2-40B4-BE49-F238E27FC236}">
-                <a16:creationId xmlns:a16="http://schemas.microsoft.com/office/drawing/2014/main" id="{E993F570-629C-48C3-977B-278A8B3416CB}"/>
+                <a16:creationId xmlns:a16="http://schemas.microsoft.com/office/drawing/2014/main" id="{77A49DBB-8B30-4C35-9F80-CA8A7F36F7ED}"/>
               </a:ext>
             </a:extLst>
           </p:cNvPr>
@@ -5218,8 +4849,8 @@
         </p:blipFill>
         <p:spPr>
           <a:xfrm>
-            <a:off x="742950" y="2377848"/>
-            <a:ext cx="10706100" cy="4257675"/>
+            <a:off x="2081212" y="2396898"/>
+            <a:ext cx="8029575" cy="4829175"/>
           </a:xfrm>
           <a:prstGeom prst="rect">
             <a:avLst/>
@@ -5228,10 +4859,10 @@
       </p:pic>
       <p:sp>
         <p:nvSpPr>
-          <p:cNvPr id="8" name="TextBox 7">
+          <p:cNvPr id="4" name="TextBox 3">
             <a:extLst>
               <a:ext uri="{FF2B5EF4-FFF2-40B4-BE49-F238E27FC236}">
-                <a16:creationId xmlns:a16="http://schemas.microsoft.com/office/drawing/2014/main" id="{169B2A1F-660A-41AE-8A3C-7C19219BD98D}"/>
+                <a16:creationId xmlns:a16="http://schemas.microsoft.com/office/drawing/2014/main" id="{C8D24DA1-65C6-439D-A13F-9847815C1365}"/>
               </a:ext>
             </a:extLst>
           </p:cNvPr>
@@ -5240,8 +4871,8 @@
         </p:nvSpPr>
         <p:spPr>
           <a:xfrm>
-            <a:off x="1978430" y="6894286"/>
-            <a:ext cx="8235140" cy="461665"/>
+            <a:off x="2138505" y="7561942"/>
+            <a:ext cx="7914987" cy="461665"/>
           </a:xfrm>
           <a:prstGeom prst="rect">
             <a:avLst/>
@@ -5256,15 +4887,7 @@
           <a:p>
             <a:r>
               <a:rPr lang="en-US" sz="2400" dirty="0"/>
-              <a:t>**Unnecessary fields are dropped, and </a:t>
-            </a:r>
-            <a:r>
-              <a:rPr lang="en-US" sz="2400" dirty="0" err="1"/>
-              <a:t>csv_name</a:t>
-            </a:r>
-            <a:r>
-              <a:rPr lang="en-US" sz="2400" dirty="0"/>
-              <a:t> field is parsed </a:t>
+              <a:t>**Isolated the job description (usually) text into its own series</a:t>
             </a:r>
           </a:p>
         </p:txBody>
@@ -5272,7 +4895,7 @@
     </p:spTree>
     <p:extLst>
       <p:ext uri="{BB962C8B-B14F-4D97-AF65-F5344CB8AC3E}">
-        <p14:creationId xmlns:p14="http://schemas.microsoft.com/office/powerpoint/2010/main" val="2341473965"/>
+        <p14:creationId xmlns:p14="http://schemas.microsoft.com/office/powerpoint/2010/main" val="1418195522"/>
       </p:ext>
     </p:extLst>
   </p:cSld>
@@ -5342,18 +4965,78 @@
           <a:p>
             <a:pPr algn="ctr"/>
             <a:r>
-              <a:rPr lang="en-US" sz="8800" dirty="0"/>
-              <a:t>series_of_interest</a:t>
+              <a:rPr lang="en-US" sz="8800" dirty="0" err="1"/>
+              <a:t>n_grams</a:t>
+            </a:r>
+            <a:endParaRPr lang="en-US" sz="8800" dirty="0"/>
+          </a:p>
+        </p:txBody>
+      </p:sp>
+      <p:sp>
+        <p:nvSpPr>
+          <p:cNvPr id="4" name="TextBox 3">
+            <a:extLst>
+              <a:ext uri="{FF2B5EF4-FFF2-40B4-BE49-F238E27FC236}">
+                <a16:creationId xmlns:a16="http://schemas.microsoft.com/office/drawing/2014/main" id="{C8D24DA1-65C6-439D-A13F-9847815C1365}"/>
+              </a:ext>
+            </a:extLst>
+          </p:cNvPr>
+          <p:cNvSpPr txBox="1"/>
+          <p:nvPr/>
+        </p:nvSpPr>
+        <p:spPr>
+          <a:xfrm>
+            <a:off x="2661490" y="11654970"/>
+            <a:ext cx="6651306" cy="830997"/>
+          </a:xfrm>
+          <a:prstGeom prst="rect">
+            <a:avLst/>
+          </a:prstGeom>
+          <a:noFill/>
+        </p:spPr>
+        <p:txBody>
+          <a:bodyPr wrap="square" rtlCol="0">
+            <a:spAutoFit/>
+          </a:bodyPr>
+          <a:lstStyle/>
+          <a:p>
+            <a:r>
+              <a:rPr lang="en-US" sz="2400" dirty="0"/>
+              <a:t>**</a:t>
+            </a:r>
+            <a:r>
+              <a:rPr lang="en-US" sz="2400" dirty="0" err="1"/>
+              <a:t>Dataframe</a:t>
+            </a:r>
+            <a:r>
+              <a:rPr lang="en-US" sz="2400" dirty="0"/>
+              <a:t> containing the top n count of terms, bag of words style. Counted from </a:t>
+            </a:r>
+            <a:r>
+              <a:rPr lang="en-US" sz="2400" dirty="0" err="1"/>
+              <a:t>terms_for</a:t>
+            </a:r>
+            <a:r>
+              <a:rPr lang="en-US" sz="2400" dirty="0"/>
+              <a:t> </a:t>
+            </a:r>
+            <a:r>
+              <a:rPr lang="en-US" sz="2400" dirty="0" err="1"/>
+              <a:t>nlp</a:t>
+            </a:r>
+            <a:r>
+              <a:rPr lang="en-US" sz="2400" dirty="0"/>
+              <a:t>.</a:t>
             </a:r>
           </a:p>
         </p:txBody>
       </p:sp>
       <p:pic>
         <p:nvPicPr>
-          <p:cNvPr id="7" name="Picture 6">
+          <p:cNvPr id="3" name="Picture 2">
             <a:extLst>
               <a:ext uri="{FF2B5EF4-FFF2-40B4-BE49-F238E27FC236}">
-                <a16:creationId xmlns:a16="http://schemas.microsoft.com/office/drawing/2014/main" id="{77A49DBB-8B30-4C35-9F80-CA8A7F36F7ED}"/>
+                <a16:creationId xmlns:a16="http://schemas.microsoft.com/office/drawing/2014/main" id="{630B2BB9-1F94-44E4-8470-C5E5DEE1AA83}"/>
               </a:ext>
             </a:extLst>
           </p:cNvPr>
@@ -5370,8 +5053,8 @@
         </p:blipFill>
         <p:spPr>
           <a:xfrm>
-            <a:off x="2081212" y="2396898"/>
-            <a:ext cx="8029575" cy="4829175"/>
+            <a:off x="3511044" y="2384405"/>
+            <a:ext cx="5169911" cy="8947189"/>
           </a:xfrm>
           <a:prstGeom prst="rect">
             <a:avLst/>
@@ -5381,7 +5064,7 @@
     </p:spTree>
     <p:extLst>
       <p:ext uri="{BB962C8B-B14F-4D97-AF65-F5344CB8AC3E}">
-        <p14:creationId xmlns:p14="http://schemas.microsoft.com/office/powerpoint/2010/main" val="1418195522"/>
+        <p14:creationId xmlns:p14="http://schemas.microsoft.com/office/powerpoint/2010/main" val="3783652380"/>
       </p:ext>
     </p:extLst>
   </p:cSld>
@@ -5491,6 +5174,49 @@
           </a:prstGeom>
         </p:spPr>
       </p:pic>
+      <p:sp>
+        <p:nvSpPr>
+          <p:cNvPr id="5" name="TextBox 4">
+            <a:extLst>
+              <a:ext uri="{FF2B5EF4-FFF2-40B4-BE49-F238E27FC236}">
+                <a16:creationId xmlns:a16="http://schemas.microsoft.com/office/drawing/2014/main" id="{12D5D11B-D6FC-4E78-B20C-D8BFCD201259}"/>
+              </a:ext>
+            </a:extLst>
+          </p:cNvPr>
+          <p:cNvSpPr txBox="1"/>
+          <p:nvPr/>
+        </p:nvSpPr>
+        <p:spPr>
+          <a:xfrm>
+            <a:off x="2538767" y="11042682"/>
+            <a:ext cx="7409513" cy="1200329"/>
+          </a:xfrm>
+          <a:prstGeom prst="rect">
+            <a:avLst/>
+          </a:prstGeom>
+          <a:noFill/>
+        </p:spPr>
+        <p:txBody>
+          <a:bodyPr wrap="square" rtlCol="0">
+            <a:spAutoFit/>
+          </a:bodyPr>
+          <a:lstStyle/>
+          <a:p>
+            <a:r>
+              <a:rPr lang="en-US" sz="2400" dirty="0"/>
+              <a:t>**Dictionary to do a final correction of misspellings, ambiguities or term consolidations. This is the last time the text is modified prior to </a:t>
+            </a:r>
+            <a:r>
+              <a:rPr lang="en-US" sz="2400" dirty="0" err="1"/>
+              <a:t>nlp</a:t>
+            </a:r>
+            <a:r>
+              <a:rPr lang="en-US" sz="2400" dirty="0"/>
+              <a:t> processing.</a:t>
+            </a:r>
+          </a:p>
+        </p:txBody>
+      </p:sp>
     </p:spTree>
     <p:extLst>
       <p:ext uri="{BB962C8B-B14F-4D97-AF65-F5344CB8AC3E}">
@@ -5601,6 +5327,41 @@
           </a:prstGeom>
         </p:spPr>
       </p:pic>
+      <p:sp>
+        <p:nvSpPr>
+          <p:cNvPr id="5" name="TextBox 4">
+            <a:extLst>
+              <a:ext uri="{FF2B5EF4-FFF2-40B4-BE49-F238E27FC236}">
+                <a16:creationId xmlns:a16="http://schemas.microsoft.com/office/drawing/2014/main" id="{8DA4BF87-FE59-407C-8CF8-93003A16F7B9}"/>
+              </a:ext>
+            </a:extLst>
+          </p:cNvPr>
+          <p:cNvSpPr txBox="1"/>
+          <p:nvPr/>
+        </p:nvSpPr>
+        <p:spPr>
+          <a:xfrm>
+            <a:off x="2148851" y="11985250"/>
+            <a:ext cx="7604011" cy="1200329"/>
+          </a:xfrm>
+          <a:prstGeom prst="rect">
+            <a:avLst/>
+          </a:prstGeom>
+          <a:noFill/>
+        </p:spPr>
+        <p:txBody>
+          <a:bodyPr wrap="square" rtlCol="0">
+            <a:spAutoFit/>
+          </a:bodyPr>
+          <a:lstStyle/>
+          <a:p>
+            <a:r>
+              <a:rPr lang="en-US" sz="2400" dirty="0"/>
+              <a:t>**A huge list of each term from every cleaned job description. The key starting point for a bag of words analysis.</a:t>
+            </a:r>
+          </a:p>
+        </p:txBody>
+      </p:sp>
     </p:spTree>
     <p:extLst>
       <p:ext uri="{BB962C8B-B14F-4D97-AF65-F5344CB8AC3E}">
@@ -5703,18 +5464,237 @@
         </p:blipFill>
         <p:spPr>
           <a:xfrm>
-            <a:off x="3198813" y="2350861"/>
-            <a:ext cx="5794374" cy="10391244"/>
+            <a:off x="3511335" y="2384112"/>
+            <a:ext cx="5169330" cy="9270332"/>
           </a:xfrm>
           <a:prstGeom prst="rect">
             <a:avLst/>
           </a:prstGeom>
         </p:spPr>
       </p:pic>
+      <p:sp>
+        <p:nvSpPr>
+          <p:cNvPr id="6" name="TextBox 5">
+            <a:extLst>
+              <a:ext uri="{FF2B5EF4-FFF2-40B4-BE49-F238E27FC236}">
+                <a16:creationId xmlns:a16="http://schemas.microsoft.com/office/drawing/2014/main" id="{09EC13CF-2A72-4A32-89E8-A270858C6A00}"/>
+              </a:ext>
+            </a:extLst>
+          </p:cNvPr>
+          <p:cNvSpPr txBox="1"/>
+          <p:nvPr/>
+        </p:nvSpPr>
+        <p:spPr>
+          <a:xfrm>
+            <a:off x="2422051" y="11832385"/>
+            <a:ext cx="6897956" cy="1200329"/>
+          </a:xfrm>
+          <a:prstGeom prst="rect">
+            <a:avLst/>
+          </a:prstGeom>
+          <a:noFill/>
+        </p:spPr>
+        <p:txBody>
+          <a:bodyPr wrap="square" rtlCol="0">
+            <a:spAutoFit/>
+          </a:bodyPr>
+          <a:lstStyle/>
+          <a:p>
+            <a:r>
+              <a:rPr lang="en-US" sz="2400" dirty="0"/>
+              <a:t>**A huge list containing hand-curated, industry-specific </a:t>
+            </a:r>
+            <a:r>
+              <a:rPr lang="en-US" sz="2400" dirty="0" err="1"/>
+              <a:t>stopwords</a:t>
+            </a:r>
+            <a:r>
+              <a:rPr lang="en-US" sz="2400" dirty="0"/>
+              <a:t> and additional </a:t>
+            </a:r>
+            <a:r>
+              <a:rPr lang="en-US" sz="2400" dirty="0" err="1"/>
+              <a:t>stopwords</a:t>
+            </a:r>
+            <a:r>
+              <a:rPr lang="en-US" sz="2400" dirty="0"/>
+              <a:t> not </a:t>
+            </a:r>
+            <a:r>
+              <a:rPr lang="en-US" sz="2400" dirty="0" err="1"/>
+              <a:t>caight</a:t>
+            </a:r>
+            <a:r>
+              <a:rPr lang="en-US" sz="2400" dirty="0"/>
+              <a:t> by the default NLTK </a:t>
+            </a:r>
+            <a:r>
+              <a:rPr lang="en-US" sz="2400" dirty="0" err="1"/>
+              <a:t>stopwords</a:t>
+            </a:r>
+            <a:r>
+              <a:rPr lang="en-US" sz="2400" dirty="0"/>
+              <a:t> list</a:t>
+            </a:r>
+          </a:p>
+        </p:txBody>
+      </p:sp>
     </p:spTree>
     <p:extLst>
       <p:ext uri="{BB962C8B-B14F-4D97-AF65-F5344CB8AC3E}">
         <p14:creationId xmlns:p14="http://schemas.microsoft.com/office/powerpoint/2010/main" val="698899382"/>
+      </p:ext>
+    </p:extLst>
+  </p:cSld>
+  <p:clrMapOvr>
+    <a:masterClrMapping/>
+  </p:clrMapOvr>
+</p:sld>
+</file>
+
+<file path=ppt/slides/slide9.xml><?xml version="1.0" encoding="utf-8"?>
+<p:sld xmlns:a="http://schemas.openxmlformats.org/drawingml/2006/main" xmlns:r="http://schemas.openxmlformats.org/officeDocument/2006/relationships" xmlns:p="http://schemas.openxmlformats.org/presentationml/2006/main">
+  <p:cSld>
+    <p:spTree>
+      <p:nvGrpSpPr>
+        <p:cNvPr id="1" name=""/>
+        <p:cNvGrpSpPr/>
+        <p:nvPr/>
+      </p:nvGrpSpPr>
+      <p:grpSpPr>
+        <a:xfrm>
+          <a:off x="0" y="0"/>
+          <a:ext cx="0" cy="0"/>
+          <a:chOff x="0" y="0"/>
+          <a:chExt cx="0" cy="0"/>
+        </a:xfrm>
+      </p:grpSpPr>
+      <p:sp>
+        <p:nvSpPr>
+          <p:cNvPr id="4" name="Flowchart: Predefined Process 3">
+            <a:extLst>
+              <a:ext uri="{FF2B5EF4-FFF2-40B4-BE49-F238E27FC236}">
+                <a16:creationId xmlns:a16="http://schemas.microsoft.com/office/drawing/2014/main" id="{2B8B0587-A8C7-42F0-BD7E-D6E359BE29D3}"/>
+              </a:ext>
+            </a:extLst>
+          </p:cNvPr>
+          <p:cNvSpPr/>
+          <p:nvPr/>
+        </p:nvSpPr>
+        <p:spPr>
+          <a:xfrm>
+            <a:off x="145144" y="321172"/>
+            <a:ext cx="11451770" cy="1884999"/>
+          </a:xfrm>
+          <a:prstGeom prst="flowChartPredefinedProcess">
+            <a:avLst/>
+          </a:prstGeom>
+        </p:spPr>
+        <p:style>
+          <a:lnRef idx="2">
+            <a:schemeClr val="accent6">
+              <a:shade val="50000"/>
+            </a:schemeClr>
+          </a:lnRef>
+          <a:fillRef idx="1">
+            <a:schemeClr val="accent6"/>
+          </a:fillRef>
+          <a:effectRef idx="0">
+            <a:schemeClr val="accent6"/>
+          </a:effectRef>
+          <a:fontRef idx="minor">
+            <a:schemeClr val="lt1"/>
+          </a:fontRef>
+        </p:style>
+        <p:txBody>
+          <a:bodyPr rtlCol="0" anchor="ctr"/>
+          <a:lstStyle/>
+          <a:p>
+            <a:pPr algn="ctr"/>
+            <a:r>
+              <a:rPr lang="en-US" sz="7200" dirty="0"/>
+              <a:t>skill and subtopic lists</a:t>
+            </a:r>
+          </a:p>
+        </p:txBody>
+      </p:sp>
+      <p:pic>
+        <p:nvPicPr>
+          <p:cNvPr id="3" name="Picture 2">
+            <a:extLst>
+              <a:ext uri="{FF2B5EF4-FFF2-40B4-BE49-F238E27FC236}">
+                <a16:creationId xmlns:a16="http://schemas.microsoft.com/office/drawing/2014/main" id="{99643829-0EAD-4269-9FF6-FCBAC6CBE119}"/>
+              </a:ext>
+            </a:extLst>
+          </p:cNvPr>
+          <p:cNvPicPr>
+            <a:picLocks noChangeAspect="1"/>
+          </p:cNvPicPr>
+          <p:nvPr/>
+        </p:nvPicPr>
+        <p:blipFill>
+          <a:blip r:embed="rId2"/>
+          <a:stretch>
+            <a:fillRect/>
+          </a:stretch>
+        </p:blipFill>
+        <p:spPr>
+          <a:xfrm>
+            <a:off x="2945476" y="2392393"/>
+            <a:ext cx="6301047" cy="8931214"/>
+          </a:xfrm>
+          <a:prstGeom prst="rect">
+            <a:avLst/>
+          </a:prstGeom>
+        </p:spPr>
+      </p:pic>
+      <p:sp>
+        <p:nvSpPr>
+          <p:cNvPr id="6" name="TextBox 5">
+            <a:extLst>
+              <a:ext uri="{FF2B5EF4-FFF2-40B4-BE49-F238E27FC236}">
+                <a16:creationId xmlns:a16="http://schemas.microsoft.com/office/drawing/2014/main" id="{C6BBD8DD-E4ED-4020-98E2-A6D4471BF257}"/>
+              </a:ext>
+            </a:extLst>
+          </p:cNvPr>
+          <p:cNvSpPr txBox="1"/>
+          <p:nvPr/>
+        </p:nvSpPr>
+        <p:spPr>
+          <a:xfrm>
+            <a:off x="2647021" y="11597971"/>
+            <a:ext cx="6897956" cy="1200329"/>
+          </a:xfrm>
+          <a:prstGeom prst="rect">
+            <a:avLst/>
+          </a:prstGeom>
+          <a:noFill/>
+        </p:spPr>
+        <p:txBody>
+          <a:bodyPr wrap="square" rtlCol="0">
+            <a:spAutoFit/>
+          </a:bodyPr>
+          <a:lstStyle/>
+          <a:p>
+            <a:r>
+              <a:rPr lang="en-US" sz="2400" dirty="0"/>
+              <a:t>**Lists containing terms specific to the skill (e.g., technical, professional, etc.) or subtopic (e.g., python, </a:t>
+            </a:r>
+            <a:r>
+              <a:rPr lang="en-US" sz="2400" dirty="0" err="1"/>
+              <a:t>aws</a:t>
+            </a:r>
+            <a:r>
+              <a:rPr lang="en-US" sz="2400" dirty="0"/>
+              <a:t>, etc.) of interest.</a:t>
+            </a:r>
+          </a:p>
+        </p:txBody>
+      </p:sp>
+    </p:spTree>
+    <p:extLst>
+      <p:ext uri="{BB962C8B-B14F-4D97-AF65-F5344CB8AC3E}">
+        <p14:creationId xmlns:p14="http://schemas.microsoft.com/office/powerpoint/2010/main" val="2988678349"/>
       </p:ext>
     </p:extLst>
   </p:cSld>

</xml_diff>